<commit_message>
git i github prezentacija
</commit_message>
<xml_diff>
--- a/Git i github.pptx
+++ b/Git i github.pptx
@@ -7,9 +7,35 @@
   <p:sldIdLst>
     <p:sldId id="256" r:id="rId2"/>
     <p:sldId id="257" r:id="rId3"/>
-    <p:sldId id="258" r:id="rId4"/>
-    <p:sldId id="259" r:id="rId5"/>
+    <p:sldId id="259" r:id="rId4"/>
+    <p:sldId id="258" r:id="rId5"/>
     <p:sldId id="260" r:id="rId6"/>
+    <p:sldId id="261" r:id="rId7"/>
+    <p:sldId id="262" r:id="rId8"/>
+    <p:sldId id="269" r:id="rId9"/>
+    <p:sldId id="263" r:id="rId10"/>
+    <p:sldId id="265" r:id="rId11"/>
+    <p:sldId id="264" r:id="rId12"/>
+    <p:sldId id="270" r:id="rId13"/>
+    <p:sldId id="266" r:id="rId14"/>
+    <p:sldId id="267" r:id="rId15"/>
+    <p:sldId id="272" r:id="rId16"/>
+    <p:sldId id="271" r:id="rId17"/>
+    <p:sldId id="273" r:id="rId18"/>
+    <p:sldId id="274" r:id="rId19"/>
+    <p:sldId id="276" r:id="rId20"/>
+    <p:sldId id="275" r:id="rId21"/>
+    <p:sldId id="277" r:id="rId22"/>
+    <p:sldId id="278" r:id="rId23"/>
+    <p:sldId id="279" r:id="rId24"/>
+    <p:sldId id="280" r:id="rId25"/>
+    <p:sldId id="281" r:id="rId26"/>
+    <p:sldId id="282" r:id="rId27"/>
+    <p:sldId id="284" r:id="rId28"/>
+    <p:sldId id="285" r:id="rId29"/>
+    <p:sldId id="286" r:id="rId30"/>
+    <p:sldId id="283" r:id="rId31"/>
+    <p:sldId id="287" r:id="rId32"/>
   </p:sldIdLst>
   <p:sldSz cx="12192000" cy="6858000"/>
   <p:notesSz cx="6858000" cy="9144000"/>
@@ -108,6 +134,11 @@
       </a:defRPr>
     </a:lvl9pPr>
   </p:defaultTextStyle>
+  <p:extLst>
+    <p:ext uri="{EFAFB233-063F-42B5-8137-9DF3F51BA10A}">
+      <p15:sldGuideLst xmlns:p15="http://schemas.microsoft.com/office/powerpoint/2012/main"/>
+    </p:ext>
+  </p:extLst>
 </p:presentation>
 </file>
 
@@ -161,7 +192,7 @@
           <a:noFill/>
           <a:extLst>
             <a:ext uri="{909E8E84-426E-40dd-AFC4-6F175D3DCCD1}">
-              <a14:hiddenFill xmlns:a14="http://schemas.microsoft.com/office/drawing/2010/main" xmlns="">
+              <a14:hiddenFill xmlns="" xmlns:a14="http://schemas.microsoft.com/office/drawing/2010/main">
                 <a:solidFill>
                   <a:srgbClr val="FFFFFF"/>
                 </a:solidFill>
@@ -221,7 +252,7 @@
             </a:ln>
             <a:extLst>
               <a:ext uri="{91240B29-F687-4f45-9708-019B960494DF}">
-                <a14:hiddenLine xmlns:a14="http://schemas.microsoft.com/office/drawing/2010/main" xmlns="" w="9525">
+                <a14:hiddenLine xmlns="" xmlns:a14="http://schemas.microsoft.com/office/drawing/2010/main" w="9525">
                   <a:solidFill>
                     <a:srgbClr val="000000"/>
                   </a:solidFill>
@@ -311,7 +342,7 @@
             </a:ln>
             <a:extLst>
               <a:ext uri="{91240B29-F687-4f45-9708-019B960494DF}">
-                <a14:hiddenLine xmlns:a14="http://schemas.microsoft.com/office/drawing/2010/main" xmlns="" w="9525">
+                <a14:hiddenLine xmlns="" xmlns:a14="http://schemas.microsoft.com/office/drawing/2010/main" w="9525">
                   <a:solidFill>
                     <a:srgbClr val="000000"/>
                   </a:solidFill>
@@ -401,7 +432,7 @@
             </a:ln>
             <a:extLst>
               <a:ext uri="{91240B29-F687-4f45-9708-019B960494DF}">
-                <a14:hiddenLine xmlns:a14="http://schemas.microsoft.com/office/drawing/2010/main" xmlns="" w="9525">
+                <a14:hiddenLine xmlns="" xmlns:a14="http://schemas.microsoft.com/office/drawing/2010/main" w="9525">
                   <a:solidFill>
                     <a:srgbClr val="000000"/>
                   </a:solidFill>
@@ -435,7 +466,7 @@
             </a:ln>
             <a:extLst>
               <a:ext uri="{91240B29-F687-4f45-9708-019B960494DF}">
-                <a14:hiddenLine xmlns:a14="http://schemas.microsoft.com/office/drawing/2010/main" xmlns="" w="9525">
+                <a14:hiddenLine xmlns="" xmlns:a14="http://schemas.microsoft.com/office/drawing/2010/main" w="9525">
                   <a:solidFill>
                     <a:srgbClr val="000000"/>
                   </a:solidFill>
@@ -525,7 +556,7 @@
             </a:ln>
             <a:extLst>
               <a:ext uri="{91240B29-F687-4f45-9708-019B960494DF}">
-                <a14:hiddenLine xmlns:a14="http://schemas.microsoft.com/office/drawing/2010/main" xmlns="" w="9525">
+                <a14:hiddenLine xmlns="" xmlns:a14="http://schemas.microsoft.com/office/drawing/2010/main" w="9525">
                   <a:solidFill>
                     <a:srgbClr val="000000"/>
                   </a:solidFill>
@@ -587,7 +618,7 @@
             </a:ln>
             <a:extLst>
               <a:ext uri="{91240B29-F687-4f45-9708-019B960494DF}">
-                <a14:hiddenLine xmlns:a14="http://schemas.microsoft.com/office/drawing/2010/main" xmlns="" w="9525">
+                <a14:hiddenLine xmlns="" xmlns:a14="http://schemas.microsoft.com/office/drawing/2010/main" w="9525">
                   <a:solidFill>
                     <a:srgbClr val="000000"/>
                   </a:solidFill>
@@ -649,7 +680,7 @@
             </a:ln>
             <a:extLst>
               <a:ext uri="{91240B29-F687-4f45-9708-019B960494DF}">
-                <a14:hiddenLine xmlns:a14="http://schemas.microsoft.com/office/drawing/2010/main" xmlns="" w="9525">
+                <a14:hiddenLine xmlns="" xmlns:a14="http://schemas.microsoft.com/office/drawing/2010/main" w="9525">
                   <a:solidFill>
                     <a:srgbClr val="000000"/>
                   </a:solidFill>
@@ -739,7 +770,7 @@
             </a:ln>
             <a:extLst>
               <a:ext uri="{91240B29-F687-4f45-9708-019B960494DF}">
-                <a14:hiddenLine xmlns:a14="http://schemas.microsoft.com/office/drawing/2010/main" xmlns="" w="9525">
+                <a14:hiddenLine xmlns="" xmlns:a14="http://schemas.microsoft.com/office/drawing/2010/main" w="9525">
                   <a:solidFill>
                     <a:srgbClr val="000000"/>
                   </a:solidFill>
@@ -801,7 +832,7 @@
             </a:ln>
             <a:extLst>
               <a:ext uri="{91240B29-F687-4f45-9708-019B960494DF}">
-                <a14:hiddenLine xmlns:a14="http://schemas.microsoft.com/office/drawing/2010/main" xmlns="" w="9525">
+                <a14:hiddenLine xmlns="" xmlns:a14="http://schemas.microsoft.com/office/drawing/2010/main" w="9525">
                   <a:solidFill>
                     <a:srgbClr val="000000"/>
                   </a:solidFill>
@@ -863,7 +894,7 @@
             </a:ln>
             <a:extLst>
               <a:ext uri="{91240B29-F687-4f45-9708-019B960494DF}">
-                <a14:hiddenLine xmlns:a14="http://schemas.microsoft.com/office/drawing/2010/main" xmlns="" w="9525">
+                <a14:hiddenLine xmlns="" xmlns:a14="http://schemas.microsoft.com/office/drawing/2010/main" w="9525">
                   <a:solidFill>
                     <a:srgbClr val="000000"/>
                   </a:solidFill>
@@ -953,7 +984,7 @@
             </a:ln>
             <a:extLst>
               <a:ext uri="{91240B29-F687-4f45-9708-019B960494DF}">
-                <a14:hiddenLine xmlns:a14="http://schemas.microsoft.com/office/drawing/2010/main" xmlns="" w="9525">
+                <a14:hiddenLine xmlns="" xmlns:a14="http://schemas.microsoft.com/office/drawing/2010/main" w="9525">
                   <a:solidFill>
                     <a:srgbClr val="000000"/>
                   </a:solidFill>
@@ -1043,7 +1074,7 @@
             </a:ln>
             <a:extLst>
               <a:ext uri="{91240B29-F687-4f45-9708-019B960494DF}">
-                <a14:hiddenLine xmlns:a14="http://schemas.microsoft.com/office/drawing/2010/main" xmlns="" w="9525">
+                <a14:hiddenLine xmlns="" xmlns:a14="http://schemas.microsoft.com/office/drawing/2010/main" w="9525">
                   <a:solidFill>
                     <a:srgbClr val="000000"/>
                   </a:solidFill>
@@ -1105,7 +1136,7 @@
             </a:ln>
             <a:extLst>
               <a:ext uri="{91240B29-F687-4f45-9708-019B960494DF}">
-                <a14:hiddenLine xmlns:a14="http://schemas.microsoft.com/office/drawing/2010/main" xmlns="" w="9525">
+                <a14:hiddenLine xmlns="" xmlns:a14="http://schemas.microsoft.com/office/drawing/2010/main" w="9525">
                   <a:solidFill>
                     <a:srgbClr val="000000"/>
                   </a:solidFill>
@@ -1215,7 +1246,7 @@
             </a:ln>
             <a:extLst>
               <a:ext uri="{91240B29-F687-4f45-9708-019B960494DF}">
-                <a14:hiddenLine xmlns:a14="http://schemas.microsoft.com/office/drawing/2010/main" xmlns="" w="9525">
+                <a14:hiddenLine xmlns="" xmlns:a14="http://schemas.microsoft.com/office/drawing/2010/main" w="9525">
                   <a:solidFill>
                     <a:srgbClr val="000000"/>
                   </a:solidFill>
@@ -1277,7 +1308,7 @@
             </a:ln>
             <a:extLst>
               <a:ext uri="{91240B29-F687-4f45-9708-019B960494DF}">
-                <a14:hiddenLine xmlns:a14="http://schemas.microsoft.com/office/drawing/2010/main" xmlns="" w="9525">
+                <a14:hiddenLine xmlns="" xmlns:a14="http://schemas.microsoft.com/office/drawing/2010/main" w="9525">
                   <a:solidFill>
                     <a:srgbClr val="000000"/>
                   </a:solidFill>
@@ -1367,7 +1398,7 @@
             </a:ln>
             <a:extLst>
               <a:ext uri="{91240B29-F687-4f45-9708-019B960494DF}">
-                <a14:hiddenLine xmlns:a14="http://schemas.microsoft.com/office/drawing/2010/main" xmlns="" w="9525">
+                <a14:hiddenLine xmlns="" xmlns:a14="http://schemas.microsoft.com/office/drawing/2010/main" w="9525">
                   <a:solidFill>
                     <a:srgbClr val="000000"/>
                   </a:solidFill>
@@ -1457,7 +1488,7 @@
             </a:ln>
             <a:extLst>
               <a:ext uri="{91240B29-F687-4f45-9708-019B960494DF}">
-                <a14:hiddenLine xmlns:a14="http://schemas.microsoft.com/office/drawing/2010/main" xmlns="" w="9525">
+                <a14:hiddenLine xmlns="" xmlns:a14="http://schemas.microsoft.com/office/drawing/2010/main" w="9525">
                   <a:solidFill>
                     <a:srgbClr val="000000"/>
                   </a:solidFill>
@@ -1519,7 +1550,7 @@
             </a:ln>
             <a:extLst>
               <a:ext uri="{91240B29-F687-4f45-9708-019B960494DF}">
-                <a14:hiddenLine xmlns:a14="http://schemas.microsoft.com/office/drawing/2010/main" xmlns="" w="9525">
+                <a14:hiddenLine xmlns="" xmlns:a14="http://schemas.microsoft.com/office/drawing/2010/main" w="9525">
                   <a:solidFill>
                     <a:srgbClr val="000000"/>
                   </a:solidFill>
@@ -1609,7 +1640,7 @@
             </a:ln>
             <a:extLst>
               <a:ext uri="{91240B29-F687-4f45-9708-019B960494DF}">
-                <a14:hiddenLine xmlns:a14="http://schemas.microsoft.com/office/drawing/2010/main" xmlns="" w="9525">
+                <a14:hiddenLine xmlns="" xmlns:a14="http://schemas.microsoft.com/office/drawing/2010/main" w="9525">
                   <a:solidFill>
                     <a:srgbClr val="000000"/>
                   </a:solidFill>
@@ -1699,7 +1730,7 @@
             </a:ln>
             <a:extLst>
               <a:ext uri="{91240B29-F687-4f45-9708-019B960494DF}">
-                <a14:hiddenLine xmlns:a14="http://schemas.microsoft.com/office/drawing/2010/main" xmlns="" w="9525">
+                <a14:hiddenLine xmlns="" xmlns:a14="http://schemas.microsoft.com/office/drawing/2010/main" w="9525">
                   <a:solidFill>
                     <a:srgbClr val="000000"/>
                   </a:solidFill>
@@ -1755,7 +1786,7 @@
             </a:ln>
             <a:extLst>
               <a:ext uri="{91240B29-F687-4f45-9708-019B960494DF}">
-                <a14:hiddenLine xmlns:a14="http://schemas.microsoft.com/office/drawing/2010/main" xmlns="" w="9525">
+                <a14:hiddenLine xmlns="" xmlns:a14="http://schemas.microsoft.com/office/drawing/2010/main" w="9525">
                   <a:solidFill>
                     <a:srgbClr val="000000"/>
                   </a:solidFill>
@@ -1845,7 +1876,7 @@
             </a:ln>
             <a:extLst>
               <a:ext uri="{91240B29-F687-4f45-9708-019B960494DF}">
-                <a14:hiddenLine xmlns:a14="http://schemas.microsoft.com/office/drawing/2010/main" xmlns="" w="9525">
+                <a14:hiddenLine xmlns="" xmlns:a14="http://schemas.microsoft.com/office/drawing/2010/main" w="9525">
                   <a:solidFill>
                     <a:srgbClr val="000000"/>
                   </a:solidFill>
@@ -1901,7 +1932,7 @@
             </a:ln>
             <a:extLst>
               <a:ext uri="{91240B29-F687-4f45-9708-019B960494DF}">
-                <a14:hiddenLine xmlns:a14="http://schemas.microsoft.com/office/drawing/2010/main" xmlns="" w="9525">
+                <a14:hiddenLine xmlns="" xmlns:a14="http://schemas.microsoft.com/office/drawing/2010/main" w="9525">
                   <a:solidFill>
                     <a:srgbClr val="000000"/>
                   </a:solidFill>
@@ -1991,7 +2022,7 @@
             </a:ln>
             <a:extLst>
               <a:ext uri="{91240B29-F687-4f45-9708-019B960494DF}">
-                <a14:hiddenLine xmlns:a14="http://schemas.microsoft.com/office/drawing/2010/main" xmlns="" w="9525">
+                <a14:hiddenLine xmlns="" xmlns:a14="http://schemas.microsoft.com/office/drawing/2010/main" w="9525">
                   <a:solidFill>
                     <a:srgbClr val="000000"/>
                   </a:solidFill>
@@ -2059,7 +2090,7 @@
             </a:ln>
             <a:extLst>
               <a:ext uri="{91240B29-F687-4f45-9708-019B960494DF}">
-                <a14:hiddenLine xmlns:a14="http://schemas.microsoft.com/office/drawing/2010/main" xmlns="" w="9525">
+                <a14:hiddenLine xmlns="" xmlns:a14="http://schemas.microsoft.com/office/drawing/2010/main" w="9525">
                   <a:solidFill>
                     <a:srgbClr val="000000"/>
                   </a:solidFill>
@@ -2149,7 +2180,7 @@
             </a:ln>
             <a:extLst>
               <a:ext uri="{91240B29-F687-4f45-9708-019B960494DF}">
-                <a14:hiddenLine xmlns:a14="http://schemas.microsoft.com/office/drawing/2010/main" xmlns="" w="9525">
+                <a14:hiddenLine xmlns="" xmlns:a14="http://schemas.microsoft.com/office/drawing/2010/main" w="9525">
                   <a:solidFill>
                     <a:srgbClr val="000000"/>
                   </a:solidFill>
@@ -2217,7 +2248,7 @@
             </a:ln>
             <a:extLst>
               <a:ext uri="{91240B29-F687-4f45-9708-019B960494DF}">
-                <a14:hiddenLine xmlns:a14="http://schemas.microsoft.com/office/drawing/2010/main" xmlns="" w="9525">
+                <a14:hiddenLine xmlns="" xmlns:a14="http://schemas.microsoft.com/office/drawing/2010/main" w="9525">
                   <a:solidFill>
                     <a:srgbClr val="000000"/>
                   </a:solidFill>
@@ -2307,7 +2338,7 @@
             </a:ln>
             <a:extLst>
               <a:ext uri="{91240B29-F687-4f45-9708-019B960494DF}">
-                <a14:hiddenLine xmlns:a14="http://schemas.microsoft.com/office/drawing/2010/main" xmlns="" w="9525">
+                <a14:hiddenLine xmlns="" xmlns:a14="http://schemas.microsoft.com/office/drawing/2010/main" w="9525">
                   <a:solidFill>
                     <a:srgbClr val="000000"/>
                   </a:solidFill>
@@ -2341,7 +2372,7 @@
             </a:ln>
             <a:extLst>
               <a:ext uri="{91240B29-F687-4f45-9708-019B960494DF}">
-                <a14:hiddenLine xmlns:a14="http://schemas.microsoft.com/office/drawing/2010/main" xmlns="" w="9525">
+                <a14:hiddenLine xmlns="" xmlns:a14="http://schemas.microsoft.com/office/drawing/2010/main" w="9525">
                   <a:solidFill>
                     <a:srgbClr val="000000"/>
                   </a:solidFill>
@@ -2431,7 +2462,7 @@
             </a:ln>
             <a:extLst>
               <a:ext uri="{91240B29-F687-4f45-9708-019B960494DF}">
-                <a14:hiddenLine xmlns:a14="http://schemas.microsoft.com/office/drawing/2010/main" xmlns="" w="9525">
+                <a14:hiddenLine xmlns="" xmlns:a14="http://schemas.microsoft.com/office/drawing/2010/main" w="9525">
                   <a:solidFill>
                     <a:srgbClr val="000000"/>
                   </a:solidFill>
@@ -2493,7 +2524,7 @@
             </a:ln>
             <a:extLst>
               <a:ext uri="{91240B29-F687-4f45-9708-019B960494DF}">
-                <a14:hiddenLine xmlns:a14="http://schemas.microsoft.com/office/drawing/2010/main" xmlns="" w="9525">
+                <a14:hiddenLine xmlns="" xmlns:a14="http://schemas.microsoft.com/office/drawing/2010/main" w="9525">
                   <a:solidFill>
                     <a:srgbClr val="000000"/>
                   </a:solidFill>
@@ -2555,7 +2586,7 @@
             </a:ln>
             <a:extLst>
               <a:ext uri="{91240B29-F687-4f45-9708-019B960494DF}">
-                <a14:hiddenLine xmlns:a14="http://schemas.microsoft.com/office/drawing/2010/main" xmlns="" w="9525">
+                <a14:hiddenLine xmlns="" xmlns:a14="http://schemas.microsoft.com/office/drawing/2010/main" w="9525">
                   <a:solidFill>
                     <a:srgbClr val="000000"/>
                   </a:solidFill>
@@ -2645,7 +2676,7 @@
             </a:ln>
             <a:extLst>
               <a:ext uri="{91240B29-F687-4f45-9708-019B960494DF}">
-                <a14:hiddenLine xmlns:a14="http://schemas.microsoft.com/office/drawing/2010/main" xmlns="" w="9525">
+                <a14:hiddenLine xmlns="" xmlns:a14="http://schemas.microsoft.com/office/drawing/2010/main" w="9525">
                   <a:solidFill>
                     <a:srgbClr val="000000"/>
                   </a:solidFill>
@@ -2713,7 +2744,7 @@
             </a:ln>
             <a:extLst>
               <a:ext uri="{91240B29-F687-4f45-9708-019B960494DF}">
-                <a14:hiddenLine xmlns:a14="http://schemas.microsoft.com/office/drawing/2010/main" xmlns="" w="9525">
+                <a14:hiddenLine xmlns="" xmlns:a14="http://schemas.microsoft.com/office/drawing/2010/main" w="9525">
                   <a:solidFill>
                     <a:srgbClr val="000000"/>
                   </a:solidFill>
@@ -2775,7 +2806,7 @@
             </a:ln>
             <a:extLst>
               <a:ext uri="{91240B29-F687-4f45-9708-019B960494DF}">
-                <a14:hiddenLine xmlns:a14="http://schemas.microsoft.com/office/drawing/2010/main" xmlns="" w="9525">
+                <a14:hiddenLine xmlns="" xmlns:a14="http://schemas.microsoft.com/office/drawing/2010/main" w="9525">
                   <a:solidFill>
                     <a:srgbClr val="000000"/>
                   </a:solidFill>
@@ -2865,7 +2896,7 @@
             </a:ln>
             <a:extLst>
               <a:ext uri="{91240B29-F687-4f45-9708-019B960494DF}">
-                <a14:hiddenLine xmlns:a14="http://schemas.microsoft.com/office/drawing/2010/main" xmlns="" w="9525">
+                <a14:hiddenLine xmlns="" xmlns:a14="http://schemas.microsoft.com/office/drawing/2010/main" w="9525">
                   <a:solidFill>
                     <a:srgbClr val="000000"/>
                   </a:solidFill>
@@ -2927,7 +2958,7 @@
             </a:ln>
             <a:extLst>
               <a:ext uri="{91240B29-F687-4f45-9708-019B960494DF}">
-                <a14:hiddenLine xmlns:a14="http://schemas.microsoft.com/office/drawing/2010/main" xmlns="" w="9525">
+                <a14:hiddenLine xmlns="" xmlns:a14="http://schemas.microsoft.com/office/drawing/2010/main" w="9525">
                   <a:solidFill>
                     <a:srgbClr val="000000"/>
                   </a:solidFill>
@@ -3017,7 +3048,7 @@
             </a:ln>
             <a:extLst>
               <a:ext uri="{91240B29-F687-4f45-9708-019B960494DF}">
-                <a14:hiddenLine xmlns:a14="http://schemas.microsoft.com/office/drawing/2010/main" xmlns="" w="9525">
+                <a14:hiddenLine xmlns="" xmlns:a14="http://schemas.microsoft.com/office/drawing/2010/main" w="9525">
                   <a:solidFill>
                     <a:srgbClr val="000000"/>
                   </a:solidFill>
@@ -3079,7 +3110,7 @@
             </a:ln>
             <a:extLst>
               <a:ext uri="{91240B29-F687-4f45-9708-019B960494DF}">
-                <a14:hiddenLine xmlns:a14="http://schemas.microsoft.com/office/drawing/2010/main" xmlns="" w="9525">
+                <a14:hiddenLine xmlns="" xmlns:a14="http://schemas.microsoft.com/office/drawing/2010/main" w="9525">
                   <a:solidFill>
                     <a:srgbClr val="000000"/>
                   </a:solidFill>
@@ -3169,7 +3200,7 @@
             </a:ln>
             <a:extLst>
               <a:ext uri="{91240B29-F687-4f45-9708-019B960494DF}">
-                <a14:hiddenLine xmlns:a14="http://schemas.microsoft.com/office/drawing/2010/main" xmlns="" w="9525">
+                <a14:hiddenLine xmlns="" xmlns:a14="http://schemas.microsoft.com/office/drawing/2010/main" w="9525">
                   <a:solidFill>
                     <a:srgbClr val="000000"/>
                   </a:solidFill>
@@ -3203,7 +3234,7 @@
             </a:ln>
             <a:extLst>
               <a:ext uri="{91240B29-F687-4f45-9708-019B960494DF}">
-                <a14:hiddenLine xmlns:a14="http://schemas.microsoft.com/office/drawing/2010/main" xmlns="" w="9525">
+                <a14:hiddenLine xmlns="" xmlns:a14="http://schemas.microsoft.com/office/drawing/2010/main" w="9525">
                   <a:solidFill>
                     <a:srgbClr val="000000"/>
                   </a:solidFill>
@@ -3268,7 +3299,7 @@
             </a:ln>
             <a:extLst>
               <a:ext uri="{91240B29-F687-4f45-9708-019B960494DF}">
-                <a14:hiddenLine xmlns:a14="http://schemas.microsoft.com/office/drawing/2010/main" xmlns="" w="9525">
+                <a14:hiddenLine xmlns="" xmlns:a14="http://schemas.microsoft.com/office/drawing/2010/main" w="9525">
                   <a:solidFill>
                     <a:srgbClr val="000000"/>
                   </a:solidFill>
@@ -3358,7 +3389,7 @@
             </a:ln>
             <a:extLst>
               <a:ext uri="{91240B29-F687-4f45-9708-019B960494DF}">
-                <a14:hiddenLine xmlns:a14="http://schemas.microsoft.com/office/drawing/2010/main" xmlns="" w="9525">
+                <a14:hiddenLine xmlns="" xmlns:a14="http://schemas.microsoft.com/office/drawing/2010/main" w="9525">
                   <a:solidFill>
                     <a:srgbClr val="000000"/>
                   </a:solidFill>
@@ -3420,7 +3451,7 @@
             </a:ln>
             <a:extLst>
               <a:ext uri="{91240B29-F687-4f45-9708-019B960494DF}">
-                <a14:hiddenLine xmlns:a14="http://schemas.microsoft.com/office/drawing/2010/main" xmlns="" w="9525">
+                <a14:hiddenLine xmlns="" xmlns:a14="http://schemas.microsoft.com/office/drawing/2010/main" w="9525">
                   <a:solidFill>
                     <a:srgbClr val="000000"/>
                   </a:solidFill>
@@ -3510,7 +3541,7 @@
             </a:ln>
             <a:extLst>
               <a:ext uri="{91240B29-F687-4f45-9708-019B960494DF}">
-                <a14:hiddenLine xmlns:a14="http://schemas.microsoft.com/office/drawing/2010/main" xmlns="" w="9525">
+                <a14:hiddenLine xmlns="" xmlns:a14="http://schemas.microsoft.com/office/drawing/2010/main" w="9525">
                   <a:solidFill>
                     <a:srgbClr val="000000"/>
                   </a:solidFill>
@@ -3600,7 +3631,7 @@
             </a:ln>
             <a:extLst>
               <a:ext uri="{91240B29-F687-4f45-9708-019B960494DF}">
-                <a14:hiddenLine xmlns:a14="http://schemas.microsoft.com/office/drawing/2010/main" xmlns="" w="9525">
+                <a14:hiddenLine xmlns="" xmlns:a14="http://schemas.microsoft.com/office/drawing/2010/main" w="9525">
                   <a:solidFill>
                     <a:srgbClr val="000000"/>
                   </a:solidFill>
@@ -3665,7 +3696,7 @@
             </a:ln>
             <a:extLst>
               <a:ext uri="{91240B29-F687-4f45-9708-019B960494DF}">
-                <a14:hiddenLine xmlns:a14="http://schemas.microsoft.com/office/drawing/2010/main" xmlns="" w="9525">
+                <a14:hiddenLine xmlns="" xmlns:a14="http://schemas.microsoft.com/office/drawing/2010/main" w="9525">
                   <a:solidFill>
                     <a:srgbClr val="000000"/>
                   </a:solidFill>
@@ -3727,7 +3758,7 @@
             </a:ln>
             <a:extLst>
               <a:ext uri="{91240B29-F687-4f45-9708-019B960494DF}">
-                <a14:hiddenLine xmlns:a14="http://schemas.microsoft.com/office/drawing/2010/main" xmlns="" w="9525">
+                <a14:hiddenLine xmlns="" xmlns:a14="http://schemas.microsoft.com/office/drawing/2010/main" w="9525">
                   <a:solidFill>
                     <a:srgbClr val="000000"/>
                   </a:solidFill>
@@ -3817,7 +3848,7 @@
             </a:ln>
             <a:extLst>
               <a:ext uri="{91240B29-F687-4f45-9708-019B960494DF}">
-                <a14:hiddenLine xmlns:a14="http://schemas.microsoft.com/office/drawing/2010/main" xmlns="" w="9525">
+                <a14:hiddenLine xmlns="" xmlns:a14="http://schemas.microsoft.com/office/drawing/2010/main" w="9525">
                   <a:solidFill>
                     <a:srgbClr val="000000"/>
                   </a:solidFill>
@@ -3907,7 +3938,7 @@
             </a:ln>
             <a:extLst>
               <a:ext uri="{91240B29-F687-4f45-9708-019B960494DF}">
-                <a14:hiddenLine xmlns:a14="http://schemas.microsoft.com/office/drawing/2010/main" xmlns="" w="9525">
+                <a14:hiddenLine xmlns="" xmlns:a14="http://schemas.microsoft.com/office/drawing/2010/main" w="9525">
                   <a:solidFill>
                     <a:srgbClr val="000000"/>
                   </a:solidFill>
@@ -3969,7 +4000,7 @@
             </a:ln>
             <a:extLst>
               <a:ext uri="{91240B29-F687-4f45-9708-019B960494DF}">
-                <a14:hiddenLine xmlns:a14="http://schemas.microsoft.com/office/drawing/2010/main" xmlns="" w="9525">
+                <a14:hiddenLine xmlns="" xmlns:a14="http://schemas.microsoft.com/office/drawing/2010/main" w="9525">
                   <a:solidFill>
                     <a:srgbClr val="000000"/>
                   </a:solidFill>
@@ -4089,7 +4120,7 @@
             </a:ln>
             <a:extLst>
               <a:ext uri="{91240B29-F687-4f45-9708-019B960494DF}">
-                <a14:hiddenLine xmlns:a14="http://schemas.microsoft.com/office/drawing/2010/main" xmlns="" w="9525">
+                <a14:hiddenLine xmlns="" xmlns:a14="http://schemas.microsoft.com/office/drawing/2010/main" w="9525">
                   <a:solidFill>
                     <a:srgbClr val="000000"/>
                   </a:solidFill>
@@ -4157,7 +4188,7 @@
             </a:ln>
             <a:extLst>
               <a:ext uri="{91240B29-F687-4f45-9708-019B960494DF}">
-                <a14:hiddenLine xmlns:a14="http://schemas.microsoft.com/office/drawing/2010/main" xmlns="" w="9525">
+                <a14:hiddenLine xmlns="" xmlns:a14="http://schemas.microsoft.com/office/drawing/2010/main" w="9525">
                   <a:solidFill>
                     <a:srgbClr val="000000"/>
                   </a:solidFill>
@@ -4247,7 +4278,7 @@
             </a:ln>
             <a:extLst>
               <a:ext uri="{91240B29-F687-4f45-9708-019B960494DF}">
-                <a14:hiddenLine xmlns:a14="http://schemas.microsoft.com/office/drawing/2010/main" xmlns="" w="9525">
+                <a14:hiddenLine xmlns="" xmlns:a14="http://schemas.microsoft.com/office/drawing/2010/main" w="9525">
                   <a:solidFill>
                     <a:srgbClr val="000000"/>
                   </a:solidFill>
@@ -4387,7 +4418,7 @@
           <a:p>
             <a:fld id="{2D1DAB18-B65D-4A8F-92B0-BF67ED9DCE39}" type="datetimeFigureOut">
               <a:rPr lang="en-US" smtClean="0"/>
-              <a:t>10/19/2022</a:t>
+              <a:t>10/20/2022</a:t>
             </a:fld>
             <a:endParaRPr lang="en-US" dirty="0"/>
           </a:p>
@@ -4653,7 +4684,7 @@
           <a:p>
             <a:fld id="{2D1DAB18-B65D-4A8F-92B0-BF67ED9DCE39}" type="datetimeFigureOut">
               <a:rPr lang="en-US" smtClean="0"/>
-              <a:t>10/19/2022</a:t>
+              <a:t>10/20/2022</a:t>
             </a:fld>
             <a:endParaRPr lang="en-US" dirty="0"/>
           </a:p>
@@ -4849,7 +4880,7 @@
           <a:p>
             <a:fld id="{2D1DAB18-B65D-4A8F-92B0-BF67ED9DCE39}" type="datetimeFigureOut">
               <a:rPr lang="en-US" smtClean="0"/>
-              <a:t>10/19/2022</a:t>
+              <a:t>10/20/2022</a:t>
             </a:fld>
             <a:endParaRPr lang="en-US" dirty="0"/>
           </a:p>
@@ -5112,7 +5143,7 @@
           <a:p>
             <a:fld id="{2D1DAB18-B65D-4A8F-92B0-BF67ED9DCE39}" type="datetimeFigureOut">
               <a:rPr lang="en-US" smtClean="0"/>
-              <a:t>10/19/2022</a:t>
+              <a:t>10/20/2022</a:t>
             </a:fld>
             <a:endParaRPr lang="en-US" dirty="0"/>
           </a:p>
@@ -5546,7 +5577,7 @@
           <a:p>
             <a:fld id="{2D1DAB18-B65D-4A8F-92B0-BF67ED9DCE39}" type="datetimeFigureOut">
               <a:rPr lang="en-US" smtClean="0"/>
-              <a:t>10/19/2022</a:t>
+              <a:t>10/20/2022</a:t>
             </a:fld>
             <a:endParaRPr lang="en-US" dirty="0"/>
           </a:p>
@@ -6092,7 +6123,7 @@
           <a:p>
             <a:fld id="{2D1DAB18-B65D-4A8F-92B0-BF67ED9DCE39}" type="datetimeFigureOut">
               <a:rPr lang="en-US" smtClean="0"/>
-              <a:t>10/19/2022</a:t>
+              <a:t>10/20/2022</a:t>
             </a:fld>
             <a:endParaRPr lang="en-US" dirty="0"/>
           </a:p>
@@ -6809,7 +6840,7 @@
           <a:p>
             <a:fld id="{2D1DAB18-B65D-4A8F-92B0-BF67ED9DCE39}" type="datetimeFigureOut">
               <a:rPr lang="en-US" smtClean="0"/>
-              <a:t>10/19/2022</a:t>
+              <a:t>10/20/2022</a:t>
             </a:fld>
             <a:endParaRPr lang="en-US" dirty="0"/>
           </a:p>
@@ -6979,7 +7010,7 @@
           <a:p>
             <a:fld id="{2D1DAB18-B65D-4A8F-92B0-BF67ED9DCE39}" type="datetimeFigureOut">
               <a:rPr lang="en-US" smtClean="0"/>
-              <a:t>10/19/2022</a:t>
+              <a:t>10/20/2022</a:t>
             </a:fld>
             <a:endParaRPr lang="en-US" dirty="0"/>
           </a:p>
@@ -7159,7 +7190,7 @@
           <a:p>
             <a:fld id="{2D1DAB18-B65D-4A8F-92B0-BF67ED9DCE39}" type="datetimeFigureOut">
               <a:rPr lang="en-US" smtClean="0"/>
-              <a:t>10/19/2022</a:t>
+              <a:t>10/20/2022</a:t>
             </a:fld>
             <a:endParaRPr lang="en-US" dirty="0"/>
           </a:p>
@@ -7329,7 +7360,7 @@
           <a:p>
             <a:fld id="{2D1DAB18-B65D-4A8F-92B0-BF67ED9DCE39}" type="datetimeFigureOut">
               <a:rPr lang="en-US" smtClean="0"/>
-              <a:t>10/19/2022</a:t>
+              <a:t>10/20/2022</a:t>
             </a:fld>
             <a:endParaRPr lang="en-US" dirty="0"/>
           </a:p>
@@ -7579,7 +7610,7 @@
           <a:p>
             <a:fld id="{2D1DAB18-B65D-4A8F-92B0-BF67ED9DCE39}" type="datetimeFigureOut">
               <a:rPr lang="en-US" smtClean="0"/>
-              <a:t>10/19/2022</a:t>
+              <a:t>10/20/2022</a:t>
             </a:fld>
             <a:endParaRPr lang="en-US" dirty="0"/>
           </a:p>
@@ -7811,7 +7842,7 @@
           <a:p>
             <a:fld id="{2D1DAB18-B65D-4A8F-92B0-BF67ED9DCE39}" type="datetimeFigureOut">
               <a:rPr lang="en-US" smtClean="0"/>
-              <a:t>10/19/2022</a:t>
+              <a:t>10/20/2022</a:t>
             </a:fld>
             <a:endParaRPr lang="en-US" dirty="0"/>
           </a:p>
@@ -8192,7 +8223,7 @@
           <a:p>
             <a:fld id="{2D1DAB18-B65D-4A8F-92B0-BF67ED9DCE39}" type="datetimeFigureOut">
               <a:rPr lang="en-US" smtClean="0"/>
-              <a:t>10/19/2022</a:t>
+              <a:t>10/20/2022</a:t>
             </a:fld>
             <a:endParaRPr lang="en-US" dirty="0"/>
           </a:p>
@@ -8310,7 +8341,7 @@
           <a:p>
             <a:fld id="{2D1DAB18-B65D-4A8F-92B0-BF67ED9DCE39}" type="datetimeFigureOut">
               <a:rPr lang="en-US" smtClean="0"/>
-              <a:t>10/19/2022</a:t>
+              <a:t>10/20/2022</a:t>
             </a:fld>
             <a:endParaRPr lang="en-US" dirty="0"/>
           </a:p>
@@ -8405,7 +8436,7 @@
           <a:p>
             <a:fld id="{2D1DAB18-B65D-4A8F-92B0-BF67ED9DCE39}" type="datetimeFigureOut">
               <a:rPr lang="en-US" smtClean="0"/>
-              <a:t>10/19/2022</a:t>
+              <a:t>10/20/2022</a:t>
             </a:fld>
             <a:endParaRPr lang="en-US" dirty="0"/>
           </a:p>
@@ -8654,7 +8685,7 @@
           <a:p>
             <a:fld id="{2D1DAB18-B65D-4A8F-92B0-BF67ED9DCE39}" type="datetimeFigureOut">
               <a:rPr lang="en-US" smtClean="0"/>
-              <a:t>10/19/2022</a:t>
+              <a:t>10/20/2022</a:t>
             </a:fld>
             <a:endParaRPr lang="en-US" dirty="0"/>
           </a:p>
@@ -8933,7 +8964,7 @@
           <a:p>
             <a:fld id="{2D1DAB18-B65D-4A8F-92B0-BF67ED9DCE39}" type="datetimeFigureOut">
               <a:rPr lang="en-US" smtClean="0"/>
-              <a:t>10/19/2022</a:t>
+              <a:t>10/20/2022</a:t>
             </a:fld>
             <a:endParaRPr lang="en-US" dirty="0"/>
           </a:p>
@@ -9049,7 +9080,7 @@
           <a:noFill/>
           <a:extLst>
             <a:ext uri="{909E8E84-426E-40dd-AFC4-6F175D3DCCD1}">
-              <a14:hiddenFill xmlns:a14="http://schemas.microsoft.com/office/drawing/2010/main" xmlns="">
+              <a14:hiddenFill xmlns="" xmlns:a14="http://schemas.microsoft.com/office/drawing/2010/main">
                 <a:solidFill>
                   <a:srgbClr val="FFFFFF"/>
                 </a:solidFill>
@@ -9123,7 +9154,7 @@
               </a:ln>
               <a:extLst>
                 <a:ext uri="{91240B29-F687-4f45-9708-019B960494DF}">
-                  <a14:hiddenLine xmlns:a14="http://schemas.microsoft.com/office/drawing/2010/main" xmlns="" w="9525">
+                  <a14:hiddenLine xmlns="" xmlns:a14="http://schemas.microsoft.com/office/drawing/2010/main" w="9525">
                     <a:solidFill>
                       <a:srgbClr val="000000"/>
                     </a:solidFill>
@@ -9213,7 +9244,7 @@
               </a:ln>
               <a:extLst>
                 <a:ext uri="{91240B29-F687-4f45-9708-019B960494DF}">
-                  <a14:hiddenLine xmlns:a14="http://schemas.microsoft.com/office/drawing/2010/main" xmlns="" w="9525">
+                  <a14:hiddenLine xmlns="" xmlns:a14="http://schemas.microsoft.com/office/drawing/2010/main" w="9525">
                     <a:solidFill>
                       <a:srgbClr val="000000"/>
                     </a:solidFill>
@@ -9303,7 +9334,7 @@
               </a:ln>
               <a:extLst>
                 <a:ext uri="{91240B29-F687-4f45-9708-019B960494DF}">
-                  <a14:hiddenLine xmlns:a14="http://schemas.microsoft.com/office/drawing/2010/main" xmlns="" w="9525">
+                  <a14:hiddenLine xmlns="" xmlns:a14="http://schemas.microsoft.com/office/drawing/2010/main" w="9525">
                     <a:solidFill>
                       <a:srgbClr val="000000"/>
                     </a:solidFill>
@@ -9365,7 +9396,7 @@
               </a:ln>
               <a:extLst>
                 <a:ext uri="{91240B29-F687-4f45-9708-019B960494DF}">
-                  <a14:hiddenLine xmlns:a14="http://schemas.microsoft.com/office/drawing/2010/main" xmlns="" w="9525">
+                  <a14:hiddenLine xmlns="" xmlns:a14="http://schemas.microsoft.com/office/drawing/2010/main" w="9525">
                     <a:solidFill>
                       <a:srgbClr val="000000"/>
                     </a:solidFill>
@@ -9455,7 +9486,7 @@
               </a:ln>
               <a:extLst>
                 <a:ext uri="{91240B29-F687-4f45-9708-019B960494DF}">
-                  <a14:hiddenLine xmlns:a14="http://schemas.microsoft.com/office/drawing/2010/main" xmlns="" w="9525">
+                  <a14:hiddenLine xmlns="" xmlns:a14="http://schemas.microsoft.com/office/drawing/2010/main" w="9525">
                     <a:solidFill>
                       <a:srgbClr val="000000"/>
                     </a:solidFill>
@@ -9517,7 +9548,7 @@
               </a:ln>
               <a:extLst>
                 <a:ext uri="{91240B29-F687-4f45-9708-019B960494DF}">
-                  <a14:hiddenLine xmlns:a14="http://schemas.microsoft.com/office/drawing/2010/main" xmlns="" w="9525">
+                  <a14:hiddenLine xmlns="" xmlns:a14="http://schemas.microsoft.com/office/drawing/2010/main" w="9525">
                     <a:solidFill>
                       <a:srgbClr val="000000"/>
                     </a:solidFill>
@@ -9579,7 +9610,7 @@
               </a:ln>
               <a:extLst>
                 <a:ext uri="{91240B29-F687-4f45-9708-019B960494DF}">
-                  <a14:hiddenLine xmlns:a14="http://schemas.microsoft.com/office/drawing/2010/main" xmlns="" w="9525">
+                  <a14:hiddenLine xmlns="" xmlns:a14="http://schemas.microsoft.com/office/drawing/2010/main" w="9525">
                     <a:solidFill>
                       <a:srgbClr val="000000"/>
                     </a:solidFill>
@@ -9669,7 +9700,7 @@
               </a:ln>
               <a:extLst>
                 <a:ext uri="{91240B29-F687-4f45-9708-019B960494DF}">
-                  <a14:hiddenLine xmlns:a14="http://schemas.microsoft.com/office/drawing/2010/main" xmlns="" w="9525">
+                  <a14:hiddenLine xmlns="" xmlns:a14="http://schemas.microsoft.com/office/drawing/2010/main" w="9525">
                     <a:solidFill>
                       <a:srgbClr val="000000"/>
                     </a:solidFill>
@@ -9759,7 +9790,7 @@
               </a:ln>
               <a:extLst>
                 <a:ext uri="{91240B29-F687-4f45-9708-019B960494DF}">
-                  <a14:hiddenLine xmlns:a14="http://schemas.microsoft.com/office/drawing/2010/main" xmlns="" w="9525">
+                  <a14:hiddenLine xmlns="" xmlns:a14="http://schemas.microsoft.com/office/drawing/2010/main" w="9525">
                     <a:solidFill>
                       <a:srgbClr val="000000"/>
                     </a:solidFill>
@@ -9821,7 +9852,7 @@
               </a:ln>
               <a:extLst>
                 <a:ext uri="{91240B29-F687-4f45-9708-019B960494DF}">
-                  <a14:hiddenLine xmlns:a14="http://schemas.microsoft.com/office/drawing/2010/main" xmlns="" w="9525">
+                  <a14:hiddenLine xmlns="" xmlns:a14="http://schemas.microsoft.com/office/drawing/2010/main" w="9525">
                     <a:solidFill>
                       <a:srgbClr val="000000"/>
                     </a:solidFill>
@@ -9931,7 +9962,7 @@
               </a:ln>
               <a:extLst>
                 <a:ext uri="{91240B29-F687-4f45-9708-019B960494DF}">
-                  <a14:hiddenLine xmlns:a14="http://schemas.microsoft.com/office/drawing/2010/main" xmlns="" w="9525">
+                  <a14:hiddenLine xmlns="" xmlns:a14="http://schemas.microsoft.com/office/drawing/2010/main" w="9525">
                     <a:solidFill>
                       <a:srgbClr val="000000"/>
                     </a:solidFill>
@@ -10015,7 +10046,7 @@
               </a:ln>
               <a:extLst>
                 <a:ext uri="{91240B29-F687-4f45-9708-019B960494DF}">
-                  <a14:hiddenLine xmlns:a14="http://schemas.microsoft.com/office/drawing/2010/main" xmlns="" w="9525">
+                  <a14:hiddenLine xmlns="" xmlns:a14="http://schemas.microsoft.com/office/drawing/2010/main" w="9525">
                     <a:solidFill>
                       <a:srgbClr val="000000"/>
                     </a:solidFill>
@@ -10077,7 +10108,7 @@
               </a:ln>
               <a:extLst>
                 <a:ext uri="{91240B29-F687-4f45-9708-019B960494DF}">
-                  <a14:hiddenLine xmlns:a14="http://schemas.microsoft.com/office/drawing/2010/main" xmlns="" w="9525">
+                  <a14:hiddenLine xmlns="" xmlns:a14="http://schemas.microsoft.com/office/drawing/2010/main" w="9525">
                     <a:solidFill>
                       <a:srgbClr val="000000"/>
                     </a:solidFill>
@@ -10139,7 +10170,7 @@
               </a:ln>
               <a:extLst>
                 <a:ext uri="{91240B29-F687-4f45-9708-019B960494DF}">
-                  <a14:hiddenLine xmlns:a14="http://schemas.microsoft.com/office/drawing/2010/main" xmlns="" w="9525">
+                  <a14:hiddenLine xmlns="" xmlns:a14="http://schemas.microsoft.com/office/drawing/2010/main" w="9525">
                     <a:solidFill>
                       <a:srgbClr val="000000"/>
                     </a:solidFill>
@@ -10229,7 +10260,7 @@
               </a:ln>
               <a:extLst>
                 <a:ext uri="{91240B29-F687-4f45-9708-019B960494DF}">
-                  <a14:hiddenLine xmlns:a14="http://schemas.microsoft.com/office/drawing/2010/main" xmlns="" w="9525">
+                  <a14:hiddenLine xmlns="" xmlns:a14="http://schemas.microsoft.com/office/drawing/2010/main" w="9525">
                     <a:solidFill>
                       <a:srgbClr val="000000"/>
                     </a:solidFill>
@@ -10263,7 +10294,7 @@
               </a:ln>
               <a:extLst>
                 <a:ext uri="{91240B29-F687-4f45-9708-019B960494DF}">
-                  <a14:hiddenLine xmlns:a14="http://schemas.microsoft.com/office/drawing/2010/main" xmlns="" w="9525">
+                  <a14:hiddenLine xmlns="" xmlns:a14="http://schemas.microsoft.com/office/drawing/2010/main" w="9525">
                     <a:solidFill>
                       <a:srgbClr val="000000"/>
                     </a:solidFill>
@@ -10328,7 +10359,7 @@
               </a:ln>
               <a:extLst>
                 <a:ext uri="{91240B29-F687-4f45-9708-019B960494DF}">
-                  <a14:hiddenLine xmlns:a14="http://schemas.microsoft.com/office/drawing/2010/main" xmlns="" w="9525">
+                  <a14:hiddenLine xmlns="" xmlns:a14="http://schemas.microsoft.com/office/drawing/2010/main" w="9525">
                     <a:solidFill>
                       <a:srgbClr val="000000"/>
                     </a:solidFill>
@@ -10418,7 +10449,7 @@
               </a:ln>
               <a:extLst>
                 <a:ext uri="{91240B29-F687-4f45-9708-019B960494DF}">
-                  <a14:hiddenLine xmlns:a14="http://schemas.microsoft.com/office/drawing/2010/main" xmlns="" w="9525">
+                  <a14:hiddenLine xmlns="" xmlns:a14="http://schemas.microsoft.com/office/drawing/2010/main" w="9525">
                     <a:solidFill>
                       <a:srgbClr val="000000"/>
                     </a:solidFill>
@@ -10480,7 +10511,7 @@
               </a:ln>
               <a:extLst>
                 <a:ext uri="{91240B29-F687-4f45-9708-019B960494DF}">
-                  <a14:hiddenLine xmlns:a14="http://schemas.microsoft.com/office/drawing/2010/main" xmlns="" w="9525">
+                  <a14:hiddenLine xmlns="" xmlns:a14="http://schemas.microsoft.com/office/drawing/2010/main" w="9525">
                     <a:solidFill>
                       <a:srgbClr val="000000"/>
                     </a:solidFill>
@@ -10570,7 +10601,7 @@
               </a:ln>
               <a:extLst>
                 <a:ext uri="{91240B29-F687-4f45-9708-019B960494DF}">
-                  <a14:hiddenLine xmlns:a14="http://schemas.microsoft.com/office/drawing/2010/main" xmlns="" w="9525">
+                  <a14:hiddenLine xmlns="" xmlns:a14="http://schemas.microsoft.com/office/drawing/2010/main" w="9525">
                     <a:solidFill>
                       <a:srgbClr val="000000"/>
                     </a:solidFill>
@@ -10635,7 +10666,7 @@
               </a:ln>
               <a:extLst>
                 <a:ext uri="{91240B29-F687-4f45-9708-019B960494DF}">
-                  <a14:hiddenLine xmlns:a14="http://schemas.microsoft.com/office/drawing/2010/main" xmlns="" w="9525">
+                  <a14:hiddenLine xmlns="" xmlns:a14="http://schemas.microsoft.com/office/drawing/2010/main" w="9525">
                     <a:solidFill>
                       <a:srgbClr val="000000"/>
                     </a:solidFill>
@@ -10697,7 +10728,7 @@
               </a:ln>
               <a:extLst>
                 <a:ext uri="{91240B29-F687-4f45-9708-019B960494DF}">
-                  <a14:hiddenLine xmlns:a14="http://schemas.microsoft.com/office/drawing/2010/main" xmlns="" w="9525">
+                  <a14:hiddenLine xmlns="" xmlns:a14="http://schemas.microsoft.com/office/drawing/2010/main" w="9525">
                     <a:solidFill>
                       <a:srgbClr val="000000"/>
                     </a:solidFill>
@@ -10787,7 +10818,7 @@
               </a:ln>
               <a:extLst>
                 <a:ext uri="{91240B29-F687-4f45-9708-019B960494DF}">
-                  <a14:hiddenLine xmlns:a14="http://schemas.microsoft.com/office/drawing/2010/main" xmlns="" w="9525">
+                  <a14:hiddenLine xmlns="" xmlns:a14="http://schemas.microsoft.com/office/drawing/2010/main" w="9525">
                     <a:solidFill>
                       <a:srgbClr val="000000"/>
                     </a:solidFill>
@@ -10877,7 +10908,7 @@
               </a:ln>
               <a:extLst>
                 <a:ext uri="{91240B29-F687-4f45-9708-019B960494DF}">
-                  <a14:hiddenLine xmlns:a14="http://schemas.microsoft.com/office/drawing/2010/main" xmlns="" w="9525">
+                  <a14:hiddenLine xmlns="" xmlns:a14="http://schemas.microsoft.com/office/drawing/2010/main" w="9525">
                     <a:solidFill>
                       <a:srgbClr val="000000"/>
                     </a:solidFill>
@@ -10942,7 +10973,7 @@
               </a:ln>
               <a:extLst>
                 <a:ext uri="{91240B29-F687-4f45-9708-019B960494DF}">
-                  <a14:hiddenLine xmlns:a14="http://schemas.microsoft.com/office/drawing/2010/main" xmlns="" w="9525">
+                  <a14:hiddenLine xmlns="" xmlns:a14="http://schemas.microsoft.com/office/drawing/2010/main" w="9525">
                     <a:solidFill>
                       <a:srgbClr val="000000"/>
                     </a:solidFill>
@@ -11062,7 +11093,7 @@
               </a:ln>
               <a:extLst>
                 <a:ext uri="{91240B29-F687-4f45-9708-019B960494DF}">
-                  <a14:hiddenLine xmlns:a14="http://schemas.microsoft.com/office/drawing/2010/main" xmlns="" w="9525">
+                  <a14:hiddenLine xmlns="" xmlns:a14="http://schemas.microsoft.com/office/drawing/2010/main" w="9525">
                     <a:solidFill>
                       <a:srgbClr val="000000"/>
                     </a:solidFill>
@@ -11160,7 +11191,7 @@
               </a:ln>
               <a:extLst>
                 <a:ext uri="{91240B29-F687-4f45-9708-019B960494DF}">
-                  <a14:hiddenLine xmlns:a14="http://schemas.microsoft.com/office/drawing/2010/main" xmlns="" w="9525">
+                  <a14:hiddenLine xmlns="" xmlns:a14="http://schemas.microsoft.com/office/drawing/2010/main" w="9525">
                     <a:solidFill>
                       <a:srgbClr val="000000"/>
                     </a:solidFill>
@@ -11275,7 +11306,7 @@
               </a:ln>
               <a:extLst>
                 <a:ext uri="{91240B29-F687-4f45-9708-019B960494DF}">
-                  <a14:hiddenLine xmlns:a14="http://schemas.microsoft.com/office/drawing/2010/main" xmlns="" w="9525">
+                  <a14:hiddenLine xmlns="" xmlns:a14="http://schemas.microsoft.com/office/drawing/2010/main" w="9525">
                     <a:solidFill>
                       <a:srgbClr val="000000"/>
                     </a:solidFill>
@@ -11365,7 +11396,7 @@
               </a:ln>
               <a:extLst>
                 <a:ext uri="{91240B29-F687-4f45-9708-019B960494DF}">
-                  <a14:hiddenLine xmlns:a14="http://schemas.microsoft.com/office/drawing/2010/main" xmlns="" w="9525">
+                  <a14:hiddenLine xmlns="" xmlns:a14="http://schemas.microsoft.com/office/drawing/2010/main" w="9525">
                     <a:solidFill>
                       <a:srgbClr val="000000"/>
                     </a:solidFill>
@@ -11430,7 +11461,7 @@
               </a:ln>
               <a:extLst>
                 <a:ext uri="{91240B29-F687-4f45-9708-019B960494DF}">
-                  <a14:hiddenLine xmlns:a14="http://schemas.microsoft.com/office/drawing/2010/main" xmlns="" w="9525">
+                  <a14:hiddenLine xmlns="" xmlns:a14="http://schemas.microsoft.com/office/drawing/2010/main" w="9525">
                     <a:solidFill>
                       <a:srgbClr val="000000"/>
                     </a:solidFill>
@@ -11520,7 +11551,7 @@
               </a:ln>
               <a:extLst>
                 <a:ext uri="{91240B29-F687-4f45-9708-019B960494DF}">
-                  <a14:hiddenLine xmlns:a14="http://schemas.microsoft.com/office/drawing/2010/main" xmlns="" w="9525">
+                  <a14:hiddenLine xmlns="" xmlns:a14="http://schemas.microsoft.com/office/drawing/2010/main" w="9525">
                     <a:solidFill>
                       <a:srgbClr val="000000"/>
                     </a:solidFill>
@@ -11588,7 +11619,7 @@
               </a:ln>
               <a:extLst>
                 <a:ext uri="{91240B29-F687-4f45-9708-019B960494DF}">
-                  <a14:hiddenLine xmlns:a14="http://schemas.microsoft.com/office/drawing/2010/main" xmlns="" w="9525">
+                  <a14:hiddenLine xmlns="" xmlns:a14="http://schemas.microsoft.com/office/drawing/2010/main" w="9525">
                     <a:solidFill>
                       <a:srgbClr val="000000"/>
                     </a:solidFill>
@@ -11678,7 +11709,7 @@
               </a:ln>
               <a:extLst>
                 <a:ext uri="{91240B29-F687-4f45-9708-019B960494DF}">
-                  <a14:hiddenLine xmlns:a14="http://schemas.microsoft.com/office/drawing/2010/main" xmlns="" w="9525">
+                  <a14:hiddenLine xmlns="" xmlns:a14="http://schemas.microsoft.com/office/drawing/2010/main" w="9525">
                     <a:solidFill>
                       <a:srgbClr val="000000"/>
                     </a:solidFill>
@@ -11746,7 +11777,7 @@
               </a:ln>
               <a:extLst>
                 <a:ext uri="{91240B29-F687-4f45-9708-019B960494DF}">
-                  <a14:hiddenLine xmlns:a14="http://schemas.microsoft.com/office/drawing/2010/main" xmlns="" w="9525">
+                  <a14:hiddenLine xmlns="" xmlns:a14="http://schemas.microsoft.com/office/drawing/2010/main" w="9525">
                     <a:solidFill>
                       <a:srgbClr val="000000"/>
                     </a:solidFill>
@@ -11836,7 +11867,7 @@
               </a:ln>
               <a:extLst>
                 <a:ext uri="{91240B29-F687-4f45-9708-019B960494DF}">
-                  <a14:hiddenLine xmlns:a14="http://schemas.microsoft.com/office/drawing/2010/main" xmlns="" w="9525">
+                  <a14:hiddenLine xmlns="" xmlns:a14="http://schemas.microsoft.com/office/drawing/2010/main" w="9525">
                     <a:solidFill>
                       <a:srgbClr val="000000"/>
                     </a:solidFill>
@@ -11870,7 +11901,7 @@
               </a:ln>
               <a:extLst>
                 <a:ext uri="{91240B29-F687-4f45-9708-019B960494DF}">
-                  <a14:hiddenLine xmlns:a14="http://schemas.microsoft.com/office/drawing/2010/main" xmlns="" w="9525">
+                  <a14:hiddenLine xmlns="" xmlns:a14="http://schemas.microsoft.com/office/drawing/2010/main" w="9525">
                     <a:solidFill>
                       <a:srgbClr val="000000"/>
                     </a:solidFill>
@@ -12010,7 +12041,7 @@
           <a:p>
             <a:fld id="{2D1DAB18-B65D-4A8F-92B0-BF67ED9DCE39}" type="datetimeFigureOut">
               <a:rPr lang="en-US" smtClean="0"/>
-              <a:t>10/19/2022</a:t>
+              <a:t>10/20/2022</a:t>
             </a:fld>
             <a:endParaRPr lang="en-US" dirty="0"/>
           </a:p>
@@ -12435,7 +12466,7 @@
           <p:cNvPr id="2" name="Title 1">
             <a:extLst>
               <a:ext uri="{FF2B5EF4-FFF2-40B4-BE49-F238E27FC236}">
-                <a16:creationId xmlns:a16="http://schemas.microsoft.com/office/drawing/2014/main" id="{B622B0FC-9CA4-BB35-42FA-65B9E1660826}"/>
+                <a16:creationId xmlns:a16="http://schemas.microsoft.com/office/drawing/2014/main" xmlns="" id="{B622B0FC-9CA4-BB35-42FA-65B9E1660826}"/>
               </a:ext>
             </a:extLst>
           </p:cNvPr>
@@ -12464,7 +12495,7 @@
           <p:cNvPr id="3" name="Subtitle 2">
             <a:extLst>
               <a:ext uri="{FF2B5EF4-FFF2-40B4-BE49-F238E27FC236}">
-                <a16:creationId xmlns:a16="http://schemas.microsoft.com/office/drawing/2014/main" id="{CF3775A5-4DB8-6343-3309-6864A4C14FE3}"/>
+                <a16:creationId xmlns:a16="http://schemas.microsoft.com/office/drawing/2014/main" xmlns="" id="{CF3775A5-4DB8-6343-3309-6864A4C14FE3}"/>
               </a:ext>
             </a:extLst>
           </p:cNvPr>
@@ -12488,6 +12519,812 @@
     <p:extLst>
       <p:ext uri="{BB962C8B-B14F-4D97-AF65-F5344CB8AC3E}">
         <p14:creationId xmlns:p14="http://schemas.microsoft.com/office/powerpoint/2010/main" val="2829322392"/>
+      </p:ext>
+    </p:extLst>
+  </p:cSld>
+  <p:clrMapOvr>
+    <a:masterClrMapping/>
+  </p:clrMapOvr>
+</p:sld>
+</file>
+
+<file path=ppt/slides/slide10.xml><?xml version="1.0" encoding="utf-8"?>
+<p:sld xmlns:a="http://schemas.openxmlformats.org/drawingml/2006/main" xmlns:r="http://schemas.openxmlformats.org/officeDocument/2006/relationships" xmlns:p="http://schemas.openxmlformats.org/presentationml/2006/main">
+  <p:cSld>
+    <p:spTree>
+      <p:nvGrpSpPr>
+        <p:cNvPr id="1" name=""/>
+        <p:cNvGrpSpPr/>
+        <p:nvPr/>
+      </p:nvGrpSpPr>
+      <p:grpSpPr>
+        <a:xfrm>
+          <a:off x="0" y="0"/>
+          <a:ext cx="0" cy="0"/>
+          <a:chOff x="0" y="0"/>
+          <a:chExt cx="0" cy="0"/>
+        </a:xfrm>
+      </p:grpSpPr>
+      <p:sp>
+        <p:nvSpPr>
+          <p:cNvPr id="2" name="Title 1"/>
+          <p:cNvSpPr>
+            <a:spLocks noGrp="1"/>
+          </p:cNvSpPr>
+          <p:nvPr>
+            <p:ph type="title"/>
+          </p:nvPr>
+        </p:nvSpPr>
+        <p:spPr/>
+        <p:txBody>
+          <a:bodyPr/>
+          <a:lstStyle/>
+          <a:p>
+            <a:r>
+              <a:rPr lang="sr-Latn-RS" dirty="0" smtClean="0"/>
+              <a:t>Provera statusa</a:t>
+            </a:r>
+            <a:endParaRPr lang="en-US" dirty="0"/>
+          </a:p>
+        </p:txBody>
+      </p:sp>
+      <p:sp>
+        <p:nvSpPr>
+          <p:cNvPr id="3" name="Content Placeholder 2"/>
+          <p:cNvSpPr>
+            <a:spLocks noGrp="1"/>
+          </p:cNvSpPr>
+          <p:nvPr>
+            <p:ph idx="1"/>
+          </p:nvPr>
+        </p:nvSpPr>
+        <p:spPr/>
+        <p:txBody>
+          <a:bodyPr/>
+          <a:lstStyle/>
+          <a:p>
+            <a:r>
+              <a:rPr lang="sr-Latn-RS" dirty="0" smtClean="0"/>
+              <a:t>git status</a:t>
+            </a:r>
+          </a:p>
+        </p:txBody>
+      </p:sp>
+    </p:spTree>
+    <p:extLst>
+      <p:ext uri="{BB962C8B-B14F-4D97-AF65-F5344CB8AC3E}">
+        <p14:creationId xmlns:p14="http://schemas.microsoft.com/office/powerpoint/2010/main" val="3919241217"/>
+      </p:ext>
+    </p:extLst>
+  </p:cSld>
+  <p:clrMapOvr>
+    <a:masterClrMapping/>
+  </p:clrMapOvr>
+</p:sld>
+</file>
+
+<file path=ppt/slides/slide11.xml><?xml version="1.0" encoding="utf-8"?>
+<p:sld xmlns:a="http://schemas.openxmlformats.org/drawingml/2006/main" xmlns:r="http://schemas.openxmlformats.org/officeDocument/2006/relationships" xmlns:p="http://schemas.openxmlformats.org/presentationml/2006/main">
+  <p:cSld>
+    <p:spTree>
+      <p:nvGrpSpPr>
+        <p:cNvPr id="1" name=""/>
+        <p:cNvGrpSpPr/>
+        <p:nvPr/>
+      </p:nvGrpSpPr>
+      <p:grpSpPr>
+        <a:xfrm>
+          <a:off x="0" y="0"/>
+          <a:ext cx="0" cy="0"/>
+          <a:chOff x="0" y="0"/>
+          <a:chExt cx="0" cy="0"/>
+        </a:xfrm>
+      </p:grpSpPr>
+      <p:sp>
+        <p:nvSpPr>
+          <p:cNvPr id="2" name="Title 1"/>
+          <p:cNvSpPr>
+            <a:spLocks noGrp="1"/>
+          </p:cNvSpPr>
+          <p:nvPr>
+            <p:ph type="title"/>
+          </p:nvPr>
+        </p:nvSpPr>
+        <p:spPr/>
+        <p:txBody>
+          <a:bodyPr/>
+          <a:lstStyle/>
+          <a:p>
+            <a:r>
+              <a:rPr lang="sr-Latn-RS" dirty="0" smtClean="0"/>
+              <a:t>Snimanje promena</a:t>
+            </a:r>
+            <a:endParaRPr lang="en-US" dirty="0"/>
+          </a:p>
+        </p:txBody>
+      </p:sp>
+      <p:sp>
+        <p:nvSpPr>
+          <p:cNvPr id="3" name="Content Placeholder 2"/>
+          <p:cNvSpPr>
+            <a:spLocks noGrp="1"/>
+          </p:cNvSpPr>
+          <p:nvPr>
+            <p:ph idx="1"/>
+          </p:nvPr>
+        </p:nvSpPr>
+        <p:spPr/>
+        <p:txBody>
+          <a:bodyPr/>
+          <a:lstStyle/>
+          <a:p>
+            <a:r>
+              <a:rPr lang="sr-Latn-RS" dirty="0" smtClean="0"/>
+              <a:t>git add &lt;filename&gt; - samo jedan fajl</a:t>
+            </a:r>
+          </a:p>
+          <a:p>
+            <a:r>
+              <a:rPr lang="sr-Latn-RS" dirty="0" smtClean="0"/>
+              <a:t>git add . – snimanje svih fajlova</a:t>
+            </a:r>
+            <a:endParaRPr lang="en-US" dirty="0"/>
+          </a:p>
+        </p:txBody>
+      </p:sp>
+    </p:spTree>
+    <p:extLst>
+      <p:ext uri="{BB962C8B-B14F-4D97-AF65-F5344CB8AC3E}">
+        <p14:creationId xmlns:p14="http://schemas.microsoft.com/office/powerpoint/2010/main" val="3889165667"/>
+      </p:ext>
+    </p:extLst>
+  </p:cSld>
+  <p:clrMapOvr>
+    <a:masterClrMapping/>
+  </p:clrMapOvr>
+</p:sld>
+</file>
+
+<file path=ppt/slides/slide12.xml><?xml version="1.0" encoding="utf-8"?>
+<p:sld xmlns:a="http://schemas.openxmlformats.org/drawingml/2006/main" xmlns:r="http://schemas.openxmlformats.org/officeDocument/2006/relationships" xmlns:p="http://schemas.openxmlformats.org/presentationml/2006/main">
+  <p:cSld>
+    <p:spTree>
+      <p:nvGrpSpPr>
+        <p:cNvPr id="1" name=""/>
+        <p:cNvGrpSpPr/>
+        <p:nvPr/>
+      </p:nvGrpSpPr>
+      <p:grpSpPr>
+        <a:xfrm>
+          <a:off x="0" y="0"/>
+          <a:ext cx="0" cy="0"/>
+          <a:chOff x="0" y="0"/>
+          <a:chExt cx="0" cy="0"/>
+        </a:xfrm>
+      </p:grpSpPr>
+      <p:sp>
+        <p:nvSpPr>
+          <p:cNvPr id="2" name="Title 1"/>
+          <p:cNvSpPr>
+            <a:spLocks noGrp="1"/>
+          </p:cNvSpPr>
+          <p:nvPr>
+            <p:ph type="title"/>
+          </p:nvPr>
+        </p:nvSpPr>
+        <p:spPr/>
+        <p:txBody>
+          <a:bodyPr/>
+          <a:lstStyle/>
+          <a:p>
+            <a:r>
+              <a:rPr lang="sr-Latn-RS" dirty="0" smtClean="0"/>
+              <a:t>ODBACIVANJE promena</a:t>
+            </a:r>
+            <a:endParaRPr lang="en-US" dirty="0"/>
+          </a:p>
+        </p:txBody>
+      </p:sp>
+      <p:sp>
+        <p:nvSpPr>
+          <p:cNvPr id="3" name="Content Placeholder 2"/>
+          <p:cNvSpPr>
+            <a:spLocks noGrp="1"/>
+          </p:cNvSpPr>
+          <p:nvPr>
+            <p:ph idx="1"/>
+          </p:nvPr>
+        </p:nvSpPr>
+        <p:spPr/>
+        <p:txBody>
+          <a:bodyPr/>
+          <a:lstStyle/>
+          <a:p>
+            <a:r>
+              <a:rPr lang="sr-Latn-RS" dirty="0" smtClean="0"/>
+              <a:t>git restore&lt;filename&gt; - samo jedan fajl</a:t>
+            </a:r>
+          </a:p>
+          <a:p>
+            <a:r>
+              <a:rPr lang="sr-Latn-RS" dirty="0" smtClean="0"/>
+              <a:t>git restore . – snimanje svih fajlova</a:t>
+            </a:r>
+            <a:endParaRPr lang="en-US" dirty="0"/>
+          </a:p>
+        </p:txBody>
+      </p:sp>
+    </p:spTree>
+    <p:extLst>
+      <p:ext uri="{BB962C8B-B14F-4D97-AF65-F5344CB8AC3E}">
+        <p14:creationId xmlns:p14="http://schemas.microsoft.com/office/powerpoint/2010/main" val="1934395020"/>
+      </p:ext>
+    </p:extLst>
+  </p:cSld>
+  <p:clrMapOvr>
+    <a:masterClrMapping/>
+  </p:clrMapOvr>
+</p:sld>
+</file>
+
+<file path=ppt/slides/slide13.xml><?xml version="1.0" encoding="utf-8"?>
+<p:sld xmlns:a="http://schemas.openxmlformats.org/drawingml/2006/main" xmlns:r="http://schemas.openxmlformats.org/officeDocument/2006/relationships" xmlns:p="http://schemas.openxmlformats.org/presentationml/2006/main">
+  <p:cSld>
+    <p:spTree>
+      <p:nvGrpSpPr>
+        <p:cNvPr id="1" name=""/>
+        <p:cNvGrpSpPr/>
+        <p:nvPr/>
+      </p:nvGrpSpPr>
+      <p:grpSpPr>
+        <a:xfrm>
+          <a:off x="0" y="0"/>
+          <a:ext cx="0" cy="0"/>
+          <a:chOff x="0" y="0"/>
+          <a:chExt cx="0" cy="0"/>
+        </a:xfrm>
+      </p:grpSpPr>
+      <p:sp>
+        <p:nvSpPr>
+          <p:cNvPr id="2" name="Title 1"/>
+          <p:cNvSpPr>
+            <a:spLocks noGrp="1"/>
+          </p:cNvSpPr>
+          <p:nvPr>
+            <p:ph type="title"/>
+          </p:nvPr>
+        </p:nvSpPr>
+        <p:spPr/>
+        <p:txBody>
+          <a:bodyPr/>
+          <a:lstStyle/>
+          <a:p>
+            <a:r>
+              <a:rPr lang="sr-Latn-RS" dirty="0" smtClean="0"/>
+              <a:t>Komitovanje</a:t>
+            </a:r>
+            <a:endParaRPr lang="en-US" dirty="0"/>
+          </a:p>
+        </p:txBody>
+      </p:sp>
+      <p:sp>
+        <p:nvSpPr>
+          <p:cNvPr id="3" name="Content Placeholder 2"/>
+          <p:cNvSpPr>
+            <a:spLocks noGrp="1"/>
+          </p:cNvSpPr>
+          <p:nvPr>
+            <p:ph idx="1"/>
+          </p:nvPr>
+        </p:nvSpPr>
+        <p:spPr/>
+        <p:txBody>
+          <a:bodyPr/>
+          <a:lstStyle/>
+          <a:p>
+            <a:r>
+              <a:rPr lang="sr-Latn-RS" dirty="0" smtClean="0"/>
+              <a:t>git commit</a:t>
+            </a:r>
+          </a:p>
+          <a:p>
+            <a:r>
+              <a:rPr lang="sr-Latn-RS" dirty="0" smtClean="0"/>
+              <a:t>git commit –m „text poruke“</a:t>
+            </a:r>
+          </a:p>
+        </p:txBody>
+      </p:sp>
+    </p:spTree>
+    <p:extLst>
+      <p:ext uri="{BB962C8B-B14F-4D97-AF65-F5344CB8AC3E}">
+        <p14:creationId xmlns:p14="http://schemas.microsoft.com/office/powerpoint/2010/main" val="2737722639"/>
+      </p:ext>
+    </p:extLst>
+  </p:cSld>
+  <p:clrMapOvr>
+    <a:masterClrMapping/>
+  </p:clrMapOvr>
+</p:sld>
+</file>
+
+<file path=ppt/slides/slide14.xml><?xml version="1.0" encoding="utf-8"?>
+<p:sld xmlns:a="http://schemas.openxmlformats.org/drawingml/2006/main" xmlns:r="http://schemas.openxmlformats.org/officeDocument/2006/relationships" xmlns:p="http://schemas.openxmlformats.org/presentationml/2006/main">
+  <p:cSld>
+    <p:spTree>
+      <p:nvGrpSpPr>
+        <p:cNvPr id="1" name=""/>
+        <p:cNvGrpSpPr/>
+        <p:nvPr/>
+      </p:nvGrpSpPr>
+      <p:grpSpPr>
+        <a:xfrm>
+          <a:off x="0" y="0"/>
+          <a:ext cx="0" cy="0"/>
+          <a:chOff x="0" y="0"/>
+          <a:chExt cx="0" cy="0"/>
+        </a:xfrm>
+      </p:grpSpPr>
+      <p:sp>
+        <p:nvSpPr>
+          <p:cNvPr id="2" name="Title 1"/>
+          <p:cNvSpPr>
+            <a:spLocks noGrp="1"/>
+          </p:cNvSpPr>
+          <p:nvPr>
+            <p:ph type="title"/>
+          </p:nvPr>
+        </p:nvSpPr>
+        <p:spPr/>
+        <p:txBody>
+          <a:bodyPr/>
+          <a:lstStyle/>
+          <a:p>
+            <a:r>
+              <a:rPr lang="sr-Latn-RS" dirty="0" smtClean="0"/>
+              <a:t>Komit logovi</a:t>
+            </a:r>
+            <a:endParaRPr lang="en-US" dirty="0"/>
+          </a:p>
+        </p:txBody>
+      </p:sp>
+      <p:sp>
+        <p:nvSpPr>
+          <p:cNvPr id="3" name="Content Placeholder 2"/>
+          <p:cNvSpPr>
+            <a:spLocks noGrp="1"/>
+          </p:cNvSpPr>
+          <p:nvPr>
+            <p:ph idx="1"/>
+          </p:nvPr>
+        </p:nvSpPr>
+        <p:spPr/>
+        <p:txBody>
+          <a:bodyPr/>
+          <a:lstStyle/>
+          <a:p>
+            <a:r>
+              <a:rPr lang="sr-Latn-RS" dirty="0" smtClean="0"/>
+              <a:t>git log</a:t>
+            </a:r>
+          </a:p>
+          <a:p>
+            <a:r>
+              <a:rPr lang="sr-Latn-RS" dirty="0" smtClean="0"/>
+              <a:t>git log --oneline</a:t>
+            </a:r>
+            <a:endParaRPr lang="en-US" dirty="0"/>
+          </a:p>
+        </p:txBody>
+      </p:sp>
+    </p:spTree>
+    <p:extLst>
+      <p:ext uri="{BB962C8B-B14F-4D97-AF65-F5344CB8AC3E}">
+        <p14:creationId xmlns:p14="http://schemas.microsoft.com/office/powerpoint/2010/main" val="3951973864"/>
+      </p:ext>
+    </p:extLst>
+  </p:cSld>
+  <p:clrMapOvr>
+    <a:masterClrMapping/>
+  </p:clrMapOvr>
+</p:sld>
+</file>
+
+<file path=ppt/slides/slide15.xml><?xml version="1.0" encoding="utf-8"?>
+<p:sld xmlns:a="http://schemas.openxmlformats.org/drawingml/2006/main" xmlns:r="http://schemas.openxmlformats.org/officeDocument/2006/relationships" xmlns:p="http://schemas.openxmlformats.org/presentationml/2006/main">
+  <p:cSld>
+    <p:spTree>
+      <p:nvGrpSpPr>
+        <p:cNvPr id="1" name=""/>
+        <p:cNvGrpSpPr/>
+        <p:nvPr/>
+      </p:nvGrpSpPr>
+      <p:grpSpPr>
+        <a:xfrm>
+          <a:off x="0" y="0"/>
+          <a:ext cx="0" cy="0"/>
+          <a:chOff x="0" y="0"/>
+          <a:chExt cx="0" cy="0"/>
+        </a:xfrm>
+      </p:grpSpPr>
+      <p:sp>
+        <p:nvSpPr>
+          <p:cNvPr id="2" name="Title 1"/>
+          <p:cNvSpPr>
+            <a:spLocks noGrp="1"/>
+          </p:cNvSpPr>
+          <p:nvPr>
+            <p:ph type="title"/>
+          </p:nvPr>
+        </p:nvSpPr>
+        <p:spPr/>
+        <p:txBody>
+          <a:bodyPr/>
+          <a:lstStyle/>
+          <a:p>
+            <a:r>
+              <a:rPr lang="sr-Latn-RS" dirty="0" smtClean="0"/>
+              <a:t>Vraćanje na prethodni komit</a:t>
+            </a:r>
+            <a:endParaRPr lang="en-US" dirty="0"/>
+          </a:p>
+        </p:txBody>
+      </p:sp>
+      <p:sp>
+        <p:nvSpPr>
+          <p:cNvPr id="3" name="Content Placeholder 2"/>
+          <p:cNvSpPr>
+            <a:spLocks noGrp="1"/>
+          </p:cNvSpPr>
+          <p:nvPr>
+            <p:ph idx="1"/>
+          </p:nvPr>
+        </p:nvSpPr>
+        <p:spPr/>
+        <p:txBody>
+          <a:bodyPr/>
+          <a:lstStyle/>
+          <a:p>
+            <a:r>
+              <a:rPr lang="sr-Latn-RS" dirty="0" smtClean="0"/>
+              <a:t>git reset &lt;commit id&gt;</a:t>
+            </a:r>
+            <a:endParaRPr lang="en-US" dirty="0"/>
+          </a:p>
+        </p:txBody>
+      </p:sp>
+    </p:spTree>
+    <p:extLst>
+      <p:ext uri="{BB962C8B-B14F-4D97-AF65-F5344CB8AC3E}">
+        <p14:creationId xmlns:p14="http://schemas.microsoft.com/office/powerpoint/2010/main" val="2119185128"/>
+      </p:ext>
+    </p:extLst>
+  </p:cSld>
+  <p:clrMapOvr>
+    <a:masterClrMapping/>
+  </p:clrMapOvr>
+</p:sld>
+</file>
+
+<file path=ppt/slides/slide16.xml><?xml version="1.0" encoding="utf-8"?>
+<p:sld xmlns:a="http://schemas.openxmlformats.org/drawingml/2006/main" xmlns:r="http://schemas.openxmlformats.org/officeDocument/2006/relationships" xmlns:p="http://schemas.openxmlformats.org/presentationml/2006/main">
+  <p:cSld>
+    <p:spTree>
+      <p:nvGrpSpPr>
+        <p:cNvPr id="1" name=""/>
+        <p:cNvGrpSpPr/>
+        <p:nvPr/>
+      </p:nvGrpSpPr>
+      <p:grpSpPr>
+        <a:xfrm>
+          <a:off x="0" y="0"/>
+          <a:ext cx="0" cy="0"/>
+          <a:chOff x="0" y="0"/>
+          <a:chExt cx="0" cy="0"/>
+        </a:xfrm>
+      </p:grpSpPr>
+      <p:sp>
+        <p:nvSpPr>
+          <p:cNvPr id="2" name="Title 1"/>
+          <p:cNvSpPr>
+            <a:spLocks noGrp="1"/>
+          </p:cNvSpPr>
+          <p:nvPr>
+            <p:ph type="title"/>
+          </p:nvPr>
+        </p:nvSpPr>
+        <p:spPr/>
+        <p:txBody>
+          <a:bodyPr/>
+          <a:lstStyle/>
+          <a:p>
+            <a:r>
+              <a:rPr lang="sr-Latn-RS" dirty="0" smtClean="0"/>
+              <a:t>grane</a:t>
+            </a:r>
+            <a:endParaRPr lang="en-US" dirty="0"/>
+          </a:p>
+        </p:txBody>
+      </p:sp>
+      <p:pic>
+        <p:nvPicPr>
+          <p:cNvPr id="3076" name="Picture 4" descr="What Is Git &amp; Why Should You Use It? | Noble Desktop Blog"/>
+          <p:cNvPicPr>
+            <a:picLocks noChangeAspect="1" noChangeArrowheads="1"/>
+          </p:cNvPicPr>
+          <p:nvPr/>
+        </p:nvPicPr>
+        <p:blipFill>
+          <a:blip r:embed="rId2">
+            <a:extLst>
+              <a:ext uri="{28A0092B-C50C-407E-A947-70E740481C1C}">
+                <a14:useLocalDpi xmlns:a14="http://schemas.microsoft.com/office/drawing/2010/main" val="0"/>
+              </a:ext>
+            </a:extLst>
+          </a:blip>
+          <a:srcRect/>
+          <a:stretch>
+            <a:fillRect/>
+          </a:stretch>
+        </p:blipFill>
+        <p:spPr bwMode="auto">
+          <a:xfrm>
+            <a:off x="2185543" y="2409303"/>
+            <a:ext cx="7223633" cy="3701366"/>
+          </a:xfrm>
+          <a:prstGeom prst="rect">
+            <a:avLst/>
+          </a:prstGeom>
+          <a:noFill/>
+          <a:extLst>
+            <a:ext uri="{909E8E84-426E-40DD-AFC4-6F175D3DCCD1}">
+              <a14:hiddenFill xmlns:a14="http://schemas.microsoft.com/office/drawing/2010/main">
+                <a:solidFill>
+                  <a:srgbClr val="FFFFFF"/>
+                </a:solidFill>
+              </a14:hiddenFill>
+            </a:ext>
+          </a:extLst>
+        </p:spPr>
+      </p:pic>
+    </p:spTree>
+    <p:extLst>
+      <p:ext uri="{BB962C8B-B14F-4D97-AF65-F5344CB8AC3E}">
+        <p14:creationId xmlns:p14="http://schemas.microsoft.com/office/powerpoint/2010/main" val="1874757649"/>
+      </p:ext>
+    </p:extLst>
+  </p:cSld>
+  <p:clrMapOvr>
+    <a:masterClrMapping/>
+  </p:clrMapOvr>
+</p:sld>
+</file>
+
+<file path=ppt/slides/slide17.xml><?xml version="1.0" encoding="utf-8"?>
+<p:sld xmlns:a="http://schemas.openxmlformats.org/drawingml/2006/main" xmlns:r="http://schemas.openxmlformats.org/officeDocument/2006/relationships" xmlns:p="http://schemas.openxmlformats.org/presentationml/2006/main">
+  <p:cSld>
+    <p:spTree>
+      <p:nvGrpSpPr>
+        <p:cNvPr id="1" name=""/>
+        <p:cNvGrpSpPr/>
+        <p:nvPr/>
+      </p:nvGrpSpPr>
+      <p:grpSpPr>
+        <a:xfrm>
+          <a:off x="0" y="0"/>
+          <a:ext cx="0" cy="0"/>
+          <a:chOff x="0" y="0"/>
+          <a:chExt cx="0" cy="0"/>
+        </a:xfrm>
+      </p:grpSpPr>
+      <p:sp>
+        <p:nvSpPr>
+          <p:cNvPr id="2" name="Title 1"/>
+          <p:cNvSpPr>
+            <a:spLocks noGrp="1"/>
+          </p:cNvSpPr>
+          <p:nvPr>
+            <p:ph type="title"/>
+          </p:nvPr>
+        </p:nvSpPr>
+        <p:spPr/>
+        <p:txBody>
+          <a:bodyPr/>
+          <a:lstStyle/>
+          <a:p>
+            <a:r>
+              <a:rPr lang="sr-Latn-RS" dirty="0" smtClean="0"/>
+              <a:t>PRIKAZ svih grana</a:t>
+            </a:r>
+            <a:endParaRPr lang="en-US" dirty="0"/>
+          </a:p>
+        </p:txBody>
+      </p:sp>
+      <p:sp>
+        <p:nvSpPr>
+          <p:cNvPr id="3" name="Content Placeholder 2"/>
+          <p:cNvSpPr>
+            <a:spLocks noGrp="1"/>
+          </p:cNvSpPr>
+          <p:nvPr>
+            <p:ph idx="1"/>
+          </p:nvPr>
+        </p:nvSpPr>
+        <p:spPr/>
+        <p:txBody>
+          <a:bodyPr/>
+          <a:lstStyle/>
+          <a:p>
+            <a:r>
+              <a:rPr lang="sr-Latn-RS" dirty="0" smtClean="0"/>
+              <a:t>git branch</a:t>
+            </a:r>
+            <a:endParaRPr lang="en-US" dirty="0"/>
+          </a:p>
+        </p:txBody>
+      </p:sp>
+    </p:spTree>
+    <p:extLst>
+      <p:ext uri="{BB962C8B-B14F-4D97-AF65-F5344CB8AC3E}">
+        <p14:creationId xmlns:p14="http://schemas.microsoft.com/office/powerpoint/2010/main" val="4065997740"/>
+      </p:ext>
+    </p:extLst>
+  </p:cSld>
+  <p:clrMapOvr>
+    <a:masterClrMapping/>
+  </p:clrMapOvr>
+</p:sld>
+</file>
+
+<file path=ppt/slides/slide18.xml><?xml version="1.0" encoding="utf-8"?>
+<p:sld xmlns:a="http://schemas.openxmlformats.org/drawingml/2006/main" xmlns:r="http://schemas.openxmlformats.org/officeDocument/2006/relationships" xmlns:p="http://schemas.openxmlformats.org/presentationml/2006/main">
+  <p:cSld>
+    <p:spTree>
+      <p:nvGrpSpPr>
+        <p:cNvPr id="1" name=""/>
+        <p:cNvGrpSpPr/>
+        <p:nvPr/>
+      </p:nvGrpSpPr>
+      <p:grpSpPr>
+        <a:xfrm>
+          <a:off x="0" y="0"/>
+          <a:ext cx="0" cy="0"/>
+          <a:chOff x="0" y="0"/>
+          <a:chExt cx="0" cy="0"/>
+        </a:xfrm>
+      </p:grpSpPr>
+      <p:sp>
+        <p:nvSpPr>
+          <p:cNvPr id="2" name="Title 1"/>
+          <p:cNvSpPr>
+            <a:spLocks noGrp="1"/>
+          </p:cNvSpPr>
+          <p:nvPr>
+            <p:ph type="title"/>
+          </p:nvPr>
+        </p:nvSpPr>
+        <p:spPr/>
+        <p:txBody>
+          <a:bodyPr/>
+          <a:lstStyle/>
+          <a:p>
+            <a:r>
+              <a:rPr lang="sr-Latn-RS" dirty="0" smtClean="0"/>
+              <a:t>Kreiranje nove grane</a:t>
+            </a:r>
+            <a:endParaRPr lang="en-US" dirty="0"/>
+          </a:p>
+        </p:txBody>
+      </p:sp>
+      <p:sp>
+        <p:nvSpPr>
+          <p:cNvPr id="3" name="Content Placeholder 2"/>
+          <p:cNvSpPr>
+            <a:spLocks noGrp="1"/>
+          </p:cNvSpPr>
+          <p:nvPr>
+            <p:ph idx="1"/>
+          </p:nvPr>
+        </p:nvSpPr>
+        <p:spPr/>
+        <p:txBody>
+          <a:bodyPr/>
+          <a:lstStyle/>
+          <a:p>
+            <a:r>
+              <a:rPr lang="sr-Latn-RS" dirty="0" smtClean="0"/>
+              <a:t>git branch &lt;ime&gt;</a:t>
+            </a:r>
+            <a:endParaRPr lang="en-US" dirty="0"/>
+          </a:p>
+        </p:txBody>
+      </p:sp>
+    </p:spTree>
+    <p:extLst>
+      <p:ext uri="{BB962C8B-B14F-4D97-AF65-F5344CB8AC3E}">
+        <p14:creationId xmlns:p14="http://schemas.microsoft.com/office/powerpoint/2010/main" val="3616155202"/>
+      </p:ext>
+    </p:extLst>
+  </p:cSld>
+  <p:clrMapOvr>
+    <a:masterClrMapping/>
+  </p:clrMapOvr>
+</p:sld>
+</file>
+
+<file path=ppt/slides/slide19.xml><?xml version="1.0" encoding="utf-8"?>
+<p:sld xmlns:a="http://schemas.openxmlformats.org/drawingml/2006/main" xmlns:r="http://schemas.openxmlformats.org/officeDocument/2006/relationships" xmlns:p="http://schemas.openxmlformats.org/presentationml/2006/main">
+  <p:cSld>
+    <p:spTree>
+      <p:nvGrpSpPr>
+        <p:cNvPr id="1" name=""/>
+        <p:cNvGrpSpPr/>
+        <p:nvPr/>
+      </p:nvGrpSpPr>
+      <p:grpSpPr>
+        <a:xfrm>
+          <a:off x="0" y="0"/>
+          <a:ext cx="0" cy="0"/>
+          <a:chOff x="0" y="0"/>
+          <a:chExt cx="0" cy="0"/>
+        </a:xfrm>
+      </p:grpSpPr>
+      <p:sp>
+        <p:nvSpPr>
+          <p:cNvPr id="2" name="Title 1"/>
+          <p:cNvSpPr>
+            <a:spLocks noGrp="1"/>
+          </p:cNvSpPr>
+          <p:nvPr>
+            <p:ph type="title"/>
+          </p:nvPr>
+        </p:nvSpPr>
+        <p:spPr/>
+        <p:txBody>
+          <a:bodyPr/>
+          <a:lstStyle/>
+          <a:p>
+            <a:r>
+              <a:rPr lang="sr-Latn-RS" dirty="0" smtClean="0"/>
+              <a:t>Prelazak u drugu granu</a:t>
+            </a:r>
+            <a:endParaRPr lang="en-US" dirty="0"/>
+          </a:p>
+        </p:txBody>
+      </p:sp>
+      <p:sp>
+        <p:nvSpPr>
+          <p:cNvPr id="3" name="Content Placeholder 2"/>
+          <p:cNvSpPr>
+            <a:spLocks noGrp="1"/>
+          </p:cNvSpPr>
+          <p:nvPr>
+            <p:ph idx="1"/>
+          </p:nvPr>
+        </p:nvSpPr>
+        <p:spPr/>
+        <p:txBody>
+          <a:bodyPr/>
+          <a:lstStyle/>
+          <a:p>
+            <a:r>
+              <a:rPr lang="sr-Latn-RS" dirty="0" smtClean="0"/>
+              <a:t>git switch &lt;grana&gt;</a:t>
+            </a:r>
+          </a:p>
+          <a:p>
+            <a:r>
+              <a:rPr lang="sr-Latn-RS" dirty="0" smtClean="0"/>
+              <a:t>git switch –c &lt;grana&gt;</a:t>
+            </a:r>
+            <a:endParaRPr lang="en-US" dirty="0"/>
+          </a:p>
+        </p:txBody>
+      </p:sp>
+    </p:spTree>
+    <p:extLst>
+      <p:ext uri="{BB962C8B-B14F-4D97-AF65-F5344CB8AC3E}">
+        <p14:creationId xmlns:p14="http://schemas.microsoft.com/office/powerpoint/2010/main" val="2606969980"/>
       </p:ext>
     </p:extLst>
   </p:cSld>
@@ -12519,7 +13356,7 @@
           <p:cNvPr id="2" name="Title 1">
             <a:extLst>
               <a:ext uri="{FF2B5EF4-FFF2-40B4-BE49-F238E27FC236}">
-                <a16:creationId xmlns:a16="http://schemas.microsoft.com/office/drawing/2014/main" id="{0C0D7024-D493-6E2E-6CCD-8A30C9D1848D}"/>
+                <a16:creationId xmlns:a16="http://schemas.microsoft.com/office/drawing/2014/main" xmlns="" id="{0C0D7024-D493-6E2E-6CCD-8A30C9D1848D}"/>
               </a:ext>
             </a:extLst>
           </p:cNvPr>
@@ -12555,6 +13392,1082 @@
     <p:extLst>
       <p:ext uri="{BB962C8B-B14F-4D97-AF65-F5344CB8AC3E}">
         <p14:creationId xmlns:p14="http://schemas.microsoft.com/office/powerpoint/2010/main" val="106488493"/>
+      </p:ext>
+    </p:extLst>
+  </p:cSld>
+  <p:clrMapOvr>
+    <a:masterClrMapping/>
+  </p:clrMapOvr>
+</p:sld>
+</file>
+
+<file path=ppt/slides/slide20.xml><?xml version="1.0" encoding="utf-8"?>
+<p:sld xmlns:a="http://schemas.openxmlformats.org/drawingml/2006/main" xmlns:r="http://schemas.openxmlformats.org/officeDocument/2006/relationships" xmlns:p="http://schemas.openxmlformats.org/presentationml/2006/main">
+  <p:cSld>
+    <p:spTree>
+      <p:nvGrpSpPr>
+        <p:cNvPr id="1" name=""/>
+        <p:cNvGrpSpPr/>
+        <p:nvPr/>
+      </p:nvGrpSpPr>
+      <p:grpSpPr>
+        <a:xfrm>
+          <a:off x="0" y="0"/>
+          <a:ext cx="0" cy="0"/>
+          <a:chOff x="0" y="0"/>
+          <a:chExt cx="0" cy="0"/>
+        </a:xfrm>
+      </p:grpSpPr>
+      <p:sp>
+        <p:nvSpPr>
+          <p:cNvPr id="2" name="Title 1"/>
+          <p:cNvSpPr>
+            <a:spLocks noGrp="1"/>
+          </p:cNvSpPr>
+          <p:nvPr>
+            <p:ph type="title"/>
+          </p:nvPr>
+        </p:nvSpPr>
+        <p:spPr/>
+        <p:txBody>
+          <a:bodyPr/>
+          <a:lstStyle/>
+          <a:p>
+            <a:r>
+              <a:rPr lang="sr-Latn-RS" dirty="0" smtClean="0"/>
+              <a:t>SPAJANJE GRANA</a:t>
+            </a:r>
+            <a:endParaRPr lang="en-US" dirty="0"/>
+          </a:p>
+        </p:txBody>
+      </p:sp>
+      <p:sp>
+        <p:nvSpPr>
+          <p:cNvPr id="3" name="Content Placeholder 2"/>
+          <p:cNvSpPr>
+            <a:spLocks noGrp="1"/>
+          </p:cNvSpPr>
+          <p:nvPr>
+            <p:ph idx="1"/>
+          </p:nvPr>
+        </p:nvSpPr>
+        <p:spPr/>
+        <p:txBody>
+          <a:bodyPr/>
+          <a:lstStyle/>
+          <a:p>
+            <a:r>
+              <a:rPr lang="sr-Latn-RS" dirty="0" smtClean="0"/>
+              <a:t>git merge –m „poruka“ &lt;grana&gt;</a:t>
+            </a:r>
+            <a:endParaRPr lang="en-US" dirty="0"/>
+          </a:p>
+        </p:txBody>
+      </p:sp>
+    </p:spTree>
+    <p:extLst>
+      <p:ext uri="{BB962C8B-B14F-4D97-AF65-F5344CB8AC3E}">
+        <p14:creationId xmlns:p14="http://schemas.microsoft.com/office/powerpoint/2010/main" val="3192182222"/>
+      </p:ext>
+    </p:extLst>
+  </p:cSld>
+  <p:clrMapOvr>
+    <a:masterClrMapping/>
+  </p:clrMapOvr>
+</p:sld>
+</file>
+
+<file path=ppt/slides/slide21.xml><?xml version="1.0" encoding="utf-8"?>
+<p:sld xmlns:a="http://schemas.openxmlformats.org/drawingml/2006/main" xmlns:r="http://schemas.openxmlformats.org/officeDocument/2006/relationships" xmlns:p="http://schemas.openxmlformats.org/presentationml/2006/main">
+  <p:cSld>
+    <p:spTree>
+      <p:nvGrpSpPr>
+        <p:cNvPr id="1" name=""/>
+        <p:cNvGrpSpPr/>
+        <p:nvPr/>
+      </p:nvGrpSpPr>
+      <p:grpSpPr>
+        <a:xfrm>
+          <a:off x="0" y="0"/>
+          <a:ext cx="0" cy="0"/>
+          <a:chOff x="0" y="0"/>
+          <a:chExt cx="0" cy="0"/>
+        </a:xfrm>
+      </p:grpSpPr>
+      <p:sp>
+        <p:nvSpPr>
+          <p:cNvPr id="2" name="Title 1"/>
+          <p:cNvSpPr>
+            <a:spLocks noGrp="1"/>
+          </p:cNvSpPr>
+          <p:nvPr>
+            <p:ph type="title"/>
+          </p:nvPr>
+        </p:nvSpPr>
+        <p:spPr/>
+        <p:txBody>
+          <a:bodyPr/>
+          <a:lstStyle/>
+          <a:p>
+            <a:r>
+              <a:rPr lang="sr-Latn-RS" dirty="0" smtClean="0"/>
+              <a:t>BRISANJE GRANA</a:t>
+            </a:r>
+            <a:endParaRPr lang="en-US" dirty="0"/>
+          </a:p>
+        </p:txBody>
+      </p:sp>
+      <p:sp>
+        <p:nvSpPr>
+          <p:cNvPr id="3" name="Content Placeholder 2"/>
+          <p:cNvSpPr>
+            <a:spLocks noGrp="1"/>
+          </p:cNvSpPr>
+          <p:nvPr>
+            <p:ph idx="1"/>
+          </p:nvPr>
+        </p:nvSpPr>
+        <p:spPr/>
+        <p:txBody>
+          <a:bodyPr/>
+          <a:lstStyle/>
+          <a:p>
+            <a:r>
+              <a:rPr lang="sr-Latn-RS" dirty="0" smtClean="0"/>
+              <a:t>git branch –</a:t>
+            </a:r>
+            <a:r>
+              <a:rPr lang="sr-Latn-RS" dirty="0"/>
+              <a:t>d</a:t>
+            </a:r>
+            <a:r>
+              <a:rPr lang="sr-Latn-RS" dirty="0" smtClean="0"/>
+              <a:t> &lt;grana&gt;</a:t>
+            </a:r>
+            <a:endParaRPr lang="en-US" dirty="0"/>
+          </a:p>
+        </p:txBody>
+      </p:sp>
+    </p:spTree>
+    <p:extLst>
+      <p:ext uri="{BB962C8B-B14F-4D97-AF65-F5344CB8AC3E}">
+        <p14:creationId xmlns:p14="http://schemas.microsoft.com/office/powerpoint/2010/main" val="2033156944"/>
+      </p:ext>
+    </p:extLst>
+  </p:cSld>
+  <p:clrMapOvr>
+    <a:masterClrMapping/>
+  </p:clrMapOvr>
+</p:sld>
+</file>
+
+<file path=ppt/slides/slide22.xml><?xml version="1.0" encoding="utf-8"?>
+<p:sld xmlns:a="http://schemas.openxmlformats.org/drawingml/2006/main" xmlns:r="http://schemas.openxmlformats.org/officeDocument/2006/relationships" xmlns:p="http://schemas.openxmlformats.org/presentationml/2006/main">
+  <p:cSld>
+    <p:spTree>
+      <p:nvGrpSpPr>
+        <p:cNvPr id="1" name=""/>
+        <p:cNvGrpSpPr/>
+        <p:nvPr/>
+      </p:nvGrpSpPr>
+      <p:grpSpPr>
+        <a:xfrm>
+          <a:off x="0" y="0"/>
+          <a:ext cx="0" cy="0"/>
+          <a:chOff x="0" y="0"/>
+          <a:chExt cx="0" cy="0"/>
+        </a:xfrm>
+      </p:grpSpPr>
+      <p:sp>
+        <p:nvSpPr>
+          <p:cNvPr id="2" name="Title 1"/>
+          <p:cNvSpPr>
+            <a:spLocks noGrp="1"/>
+          </p:cNvSpPr>
+          <p:nvPr>
+            <p:ph type="title"/>
+          </p:nvPr>
+        </p:nvSpPr>
+        <p:spPr/>
+        <p:txBody>
+          <a:bodyPr/>
+          <a:lstStyle/>
+          <a:p>
+            <a:r>
+              <a:rPr lang="sr-Latn-RS" dirty="0" smtClean="0"/>
+              <a:t>KONFLIKTI</a:t>
+            </a:r>
+            <a:endParaRPr lang="en-US" dirty="0"/>
+          </a:p>
+        </p:txBody>
+      </p:sp>
+      <p:sp>
+        <p:nvSpPr>
+          <p:cNvPr id="4" name="Content Placeholder 3"/>
+          <p:cNvSpPr>
+            <a:spLocks noGrp="1"/>
+          </p:cNvSpPr>
+          <p:nvPr>
+            <p:ph idx="1"/>
+          </p:nvPr>
+        </p:nvSpPr>
+        <p:spPr/>
+        <p:txBody>
+          <a:bodyPr/>
+          <a:lstStyle/>
+          <a:p>
+            <a:r>
+              <a:rPr lang="sr-Latn-RS" dirty="0" smtClean="0"/>
+              <a:t>Otvori se fajl</a:t>
+            </a:r>
+          </a:p>
+          <a:p>
+            <a:r>
+              <a:rPr lang="sr-Latn-RS" dirty="0" smtClean="0"/>
+              <a:t>Odabere se šta ostaje</a:t>
+            </a:r>
+          </a:p>
+          <a:p>
+            <a:r>
+              <a:rPr lang="sr-Latn-RS" dirty="0" smtClean="0"/>
+              <a:t>Stage</a:t>
+            </a:r>
+          </a:p>
+          <a:p>
+            <a:r>
+              <a:rPr lang="sr-Latn-RS" dirty="0" smtClean="0"/>
+              <a:t>Commit </a:t>
+            </a:r>
+            <a:endParaRPr lang="en-US" dirty="0"/>
+          </a:p>
+        </p:txBody>
+      </p:sp>
+    </p:spTree>
+    <p:extLst>
+      <p:ext uri="{BB962C8B-B14F-4D97-AF65-F5344CB8AC3E}">
+        <p14:creationId xmlns:p14="http://schemas.microsoft.com/office/powerpoint/2010/main" val="3551098924"/>
+      </p:ext>
+    </p:extLst>
+  </p:cSld>
+  <p:clrMapOvr>
+    <a:masterClrMapping/>
+  </p:clrMapOvr>
+</p:sld>
+</file>
+
+<file path=ppt/slides/slide23.xml><?xml version="1.0" encoding="utf-8"?>
+<p:sld xmlns:a="http://schemas.openxmlformats.org/drawingml/2006/main" xmlns:r="http://schemas.openxmlformats.org/officeDocument/2006/relationships" xmlns:p="http://schemas.openxmlformats.org/presentationml/2006/main">
+  <p:cSld>
+    <p:spTree>
+      <p:nvGrpSpPr>
+        <p:cNvPr id="1" name=""/>
+        <p:cNvGrpSpPr/>
+        <p:nvPr/>
+      </p:nvGrpSpPr>
+      <p:grpSpPr>
+        <a:xfrm>
+          <a:off x="0" y="0"/>
+          <a:ext cx="0" cy="0"/>
+          <a:chOff x="0" y="0"/>
+          <a:chExt cx="0" cy="0"/>
+        </a:xfrm>
+      </p:grpSpPr>
+      <p:sp>
+        <p:nvSpPr>
+          <p:cNvPr id="2" name="Title 1">
+            <a:extLst>
+              <a:ext uri="{FF2B5EF4-FFF2-40B4-BE49-F238E27FC236}">
+                <a16:creationId xmlns:a16="http://schemas.microsoft.com/office/drawing/2014/main" xmlns="" id="{0C0D7024-D493-6E2E-6CCD-8A30C9D1848D}"/>
+              </a:ext>
+            </a:extLst>
+          </p:cNvPr>
+          <p:cNvSpPr>
+            <a:spLocks noGrp="1"/>
+          </p:cNvSpPr>
+          <p:nvPr>
+            <p:ph type="title"/>
+          </p:nvPr>
+        </p:nvSpPr>
+        <p:spPr>
+          <a:xfrm>
+            <a:off x="1143001" y="2473822"/>
+            <a:ext cx="9905998" cy="1478570"/>
+          </a:xfrm>
+        </p:spPr>
+        <p:txBody>
+          <a:bodyPr>
+            <a:normAutofit/>
+          </a:bodyPr>
+          <a:lstStyle/>
+          <a:p>
+            <a:pPr algn="ctr"/>
+            <a:r>
+              <a:rPr lang="sr-Latn-RS" sz="4400" dirty="0" smtClean="0"/>
+              <a:t>GItHUB</a:t>
+            </a:r>
+            <a:endParaRPr lang="en-US" sz="4400" dirty="0"/>
+          </a:p>
+        </p:txBody>
+      </p:sp>
+    </p:spTree>
+    <p:extLst>
+      <p:ext uri="{BB962C8B-B14F-4D97-AF65-F5344CB8AC3E}">
+        <p14:creationId xmlns:p14="http://schemas.microsoft.com/office/powerpoint/2010/main" val="1851708712"/>
+      </p:ext>
+    </p:extLst>
+  </p:cSld>
+  <p:clrMapOvr>
+    <a:masterClrMapping/>
+  </p:clrMapOvr>
+</p:sld>
+</file>
+
+<file path=ppt/slides/slide24.xml><?xml version="1.0" encoding="utf-8"?>
+<p:sld xmlns:a="http://schemas.openxmlformats.org/drawingml/2006/main" xmlns:r="http://schemas.openxmlformats.org/officeDocument/2006/relationships" xmlns:p="http://schemas.openxmlformats.org/presentationml/2006/main">
+  <p:cSld>
+    <p:spTree>
+      <p:nvGrpSpPr>
+        <p:cNvPr id="1" name=""/>
+        <p:cNvGrpSpPr/>
+        <p:nvPr/>
+      </p:nvGrpSpPr>
+      <p:grpSpPr>
+        <a:xfrm>
+          <a:off x="0" y="0"/>
+          <a:ext cx="0" cy="0"/>
+          <a:chOff x="0" y="0"/>
+          <a:chExt cx="0" cy="0"/>
+        </a:xfrm>
+      </p:grpSpPr>
+      <p:sp>
+        <p:nvSpPr>
+          <p:cNvPr id="2" name="Title 1"/>
+          <p:cNvSpPr>
+            <a:spLocks noGrp="1"/>
+          </p:cNvSpPr>
+          <p:nvPr>
+            <p:ph type="title"/>
+          </p:nvPr>
+        </p:nvSpPr>
+        <p:spPr/>
+        <p:txBody>
+          <a:bodyPr/>
+          <a:lstStyle/>
+          <a:p>
+            <a:r>
+              <a:rPr lang="sr-Latn-RS" dirty="0" smtClean="0"/>
+              <a:t>KREIRANJE NALOGA</a:t>
+            </a:r>
+            <a:endParaRPr lang="en-US" dirty="0"/>
+          </a:p>
+        </p:txBody>
+      </p:sp>
+      <p:sp>
+        <p:nvSpPr>
+          <p:cNvPr id="5" name="Content Placeholder 2">
+            <a:extLst>
+              <a:ext uri="{FF2B5EF4-FFF2-40B4-BE49-F238E27FC236}">
+                <a16:creationId xmlns:a16="http://schemas.microsoft.com/office/drawing/2014/main" xmlns="" id="{573CBF79-52E9-0FFF-C14B-C0E2FF62CF05}"/>
+              </a:ext>
+            </a:extLst>
+          </p:cNvPr>
+          <p:cNvSpPr>
+            <a:spLocks noGrp="1"/>
+          </p:cNvSpPr>
+          <p:nvPr>
+            <p:ph idx="1"/>
+          </p:nvPr>
+        </p:nvSpPr>
+        <p:spPr>
+          <a:xfrm>
+            <a:off x="1141412" y="2249487"/>
+            <a:ext cx="9905999" cy="3541714"/>
+          </a:xfrm>
+        </p:spPr>
+        <p:txBody>
+          <a:bodyPr anchor="ctr">
+            <a:normAutofit/>
+          </a:bodyPr>
+          <a:lstStyle/>
+          <a:p>
+            <a:pPr marL="0" indent="0" algn="ctr">
+              <a:buNone/>
+            </a:pPr>
+            <a:r>
+              <a:rPr lang="en-US" sz="3200" b="1" dirty="0" smtClean="0">
+                <a:hlinkClick r:id="rId2"/>
+              </a:rPr>
+              <a:t>https://github.com/</a:t>
+            </a:r>
+            <a:endParaRPr lang="en-US" sz="3200" b="1" dirty="0"/>
+          </a:p>
+        </p:txBody>
+      </p:sp>
+    </p:spTree>
+    <p:extLst>
+      <p:ext uri="{BB962C8B-B14F-4D97-AF65-F5344CB8AC3E}">
+        <p14:creationId xmlns:p14="http://schemas.microsoft.com/office/powerpoint/2010/main" val="2242997072"/>
+      </p:ext>
+    </p:extLst>
+  </p:cSld>
+  <p:clrMapOvr>
+    <a:masterClrMapping/>
+  </p:clrMapOvr>
+</p:sld>
+</file>
+
+<file path=ppt/slides/slide25.xml><?xml version="1.0" encoding="utf-8"?>
+<p:sld xmlns:a="http://schemas.openxmlformats.org/drawingml/2006/main" xmlns:r="http://schemas.openxmlformats.org/officeDocument/2006/relationships" xmlns:p="http://schemas.openxmlformats.org/presentationml/2006/main">
+  <p:cSld>
+    <p:spTree>
+      <p:nvGrpSpPr>
+        <p:cNvPr id="1" name=""/>
+        <p:cNvGrpSpPr/>
+        <p:nvPr/>
+      </p:nvGrpSpPr>
+      <p:grpSpPr>
+        <a:xfrm>
+          <a:off x="0" y="0"/>
+          <a:ext cx="0" cy="0"/>
+          <a:chOff x="0" y="0"/>
+          <a:chExt cx="0" cy="0"/>
+        </a:xfrm>
+      </p:grpSpPr>
+      <p:sp>
+        <p:nvSpPr>
+          <p:cNvPr id="2" name="Title 1"/>
+          <p:cNvSpPr>
+            <a:spLocks noGrp="1"/>
+          </p:cNvSpPr>
+          <p:nvPr>
+            <p:ph type="title"/>
+          </p:nvPr>
+        </p:nvSpPr>
+        <p:spPr/>
+        <p:txBody>
+          <a:bodyPr/>
+          <a:lstStyle/>
+          <a:p>
+            <a:r>
+              <a:rPr lang="sr-Latn-RS" dirty="0" smtClean="0"/>
+              <a:t>KREIRANJE REPOZITORIJUMA</a:t>
+            </a:r>
+            <a:endParaRPr lang="en-US" dirty="0"/>
+          </a:p>
+        </p:txBody>
+      </p:sp>
+      <p:sp>
+        <p:nvSpPr>
+          <p:cNvPr id="3" name="Content Placeholder 2"/>
+          <p:cNvSpPr>
+            <a:spLocks noGrp="1"/>
+          </p:cNvSpPr>
+          <p:nvPr>
+            <p:ph idx="1"/>
+          </p:nvPr>
+        </p:nvSpPr>
+        <p:spPr>
+          <a:xfrm>
+            <a:off x="1141413" y="2249487"/>
+            <a:ext cx="4607118" cy="3541714"/>
+          </a:xfrm>
+        </p:spPr>
+        <p:txBody>
+          <a:bodyPr/>
+          <a:lstStyle/>
+          <a:p>
+            <a:pPr marL="0" indent="0">
+              <a:buNone/>
+            </a:pPr>
+            <a:r>
+              <a:rPr lang="sr-Latn-RS" dirty="0" smtClean="0"/>
+              <a:t>Za postojeće:</a:t>
+            </a:r>
+          </a:p>
+          <a:p>
+            <a:r>
+              <a:rPr lang="sr-Latn-RS" dirty="0" smtClean="0"/>
+              <a:t>git remote add origin &lt;url&gt;</a:t>
+            </a:r>
+          </a:p>
+          <a:p>
+            <a:r>
+              <a:rPr lang="sr-Latn-RS" dirty="0" smtClean="0"/>
+              <a:t>git push –u origin master</a:t>
+            </a:r>
+            <a:endParaRPr lang="en-US" dirty="0"/>
+          </a:p>
+        </p:txBody>
+      </p:sp>
+      <p:sp>
+        <p:nvSpPr>
+          <p:cNvPr id="4" name="Content Placeholder 2"/>
+          <p:cNvSpPr txBox="1">
+            <a:spLocks/>
+          </p:cNvSpPr>
+          <p:nvPr/>
+        </p:nvSpPr>
+        <p:spPr>
+          <a:xfrm>
+            <a:off x="5748530" y="2097088"/>
+            <a:ext cx="4538469" cy="3541714"/>
+          </a:xfrm>
+          <a:prstGeom prst="rect">
+            <a:avLst/>
+          </a:prstGeom>
+        </p:spPr>
+        <p:txBody>
+          <a:bodyPr vert="horz" lIns="91440" tIns="45720" rIns="91440" bIns="45720" rtlCol="0">
+            <a:normAutofit/>
+          </a:bodyPr>
+          <a:lstStyle>
+            <a:lvl1pPr marL="228600" indent="-228600" algn="l" defTabSz="914400" rtl="0" eaLnBrk="1" latinLnBrk="0" hangingPunct="1">
+              <a:lnSpc>
+                <a:spcPct val="120000"/>
+              </a:lnSpc>
+              <a:spcBef>
+                <a:spcPts val="1000"/>
+              </a:spcBef>
+              <a:buSzPct val="125000"/>
+              <a:buFont typeface="Arial" panose="020B0604020202020204" pitchFamily="34" charset="0"/>
+              <a:buChar char="•"/>
+              <a:defRPr sz="2400" kern="1200">
+                <a:solidFill>
+                  <a:schemeClr val="tx1"/>
+                </a:solidFill>
+                <a:latin typeface="+mn-lt"/>
+                <a:ea typeface="+mn-ea"/>
+                <a:cs typeface="+mn-cs"/>
+              </a:defRPr>
+            </a:lvl1pPr>
+            <a:lvl2pPr marL="685800" indent="-228600" algn="l" defTabSz="914400" rtl="0" eaLnBrk="1" latinLnBrk="0" hangingPunct="1">
+              <a:lnSpc>
+                <a:spcPct val="120000"/>
+              </a:lnSpc>
+              <a:spcBef>
+                <a:spcPts val="500"/>
+              </a:spcBef>
+              <a:buSzPct val="125000"/>
+              <a:buFont typeface="Arial" panose="020B0604020202020204" pitchFamily="34" charset="0"/>
+              <a:buChar char="•"/>
+              <a:defRPr sz="2000" kern="1200">
+                <a:solidFill>
+                  <a:schemeClr val="tx1"/>
+                </a:solidFill>
+                <a:latin typeface="+mn-lt"/>
+                <a:ea typeface="+mn-ea"/>
+                <a:cs typeface="+mn-cs"/>
+              </a:defRPr>
+            </a:lvl2pPr>
+            <a:lvl3pPr marL="1143000" indent="-228600" algn="l" defTabSz="914400" rtl="0" eaLnBrk="1" latinLnBrk="0" hangingPunct="1">
+              <a:lnSpc>
+                <a:spcPct val="120000"/>
+              </a:lnSpc>
+              <a:spcBef>
+                <a:spcPts val="500"/>
+              </a:spcBef>
+              <a:buSzPct val="125000"/>
+              <a:buFont typeface="Arial" panose="020B0604020202020204" pitchFamily="34" charset="0"/>
+              <a:buChar char="•"/>
+              <a:defRPr sz="1800" kern="1200">
+                <a:solidFill>
+                  <a:schemeClr val="tx1"/>
+                </a:solidFill>
+                <a:latin typeface="+mn-lt"/>
+                <a:ea typeface="+mn-ea"/>
+                <a:cs typeface="+mn-cs"/>
+              </a:defRPr>
+            </a:lvl3pPr>
+            <a:lvl4pPr marL="1600200" indent="-228600" algn="l" defTabSz="914400" rtl="0" eaLnBrk="1" latinLnBrk="0" hangingPunct="1">
+              <a:lnSpc>
+                <a:spcPct val="120000"/>
+              </a:lnSpc>
+              <a:spcBef>
+                <a:spcPts val="500"/>
+              </a:spcBef>
+              <a:buSzPct val="125000"/>
+              <a:buFont typeface="Arial" panose="020B0604020202020204" pitchFamily="34" charset="0"/>
+              <a:buChar char="•"/>
+              <a:defRPr sz="1600" kern="1200">
+                <a:solidFill>
+                  <a:schemeClr val="tx1"/>
+                </a:solidFill>
+                <a:latin typeface="+mn-lt"/>
+                <a:ea typeface="+mn-ea"/>
+                <a:cs typeface="+mn-cs"/>
+              </a:defRPr>
+            </a:lvl4pPr>
+            <a:lvl5pPr marL="2057400" indent="-228600" algn="l" defTabSz="914400" rtl="0" eaLnBrk="1" latinLnBrk="0" hangingPunct="1">
+              <a:lnSpc>
+                <a:spcPct val="120000"/>
+              </a:lnSpc>
+              <a:spcBef>
+                <a:spcPts val="500"/>
+              </a:spcBef>
+              <a:buSzPct val="125000"/>
+              <a:buFont typeface="Arial" panose="020B0604020202020204" pitchFamily="34" charset="0"/>
+              <a:buChar char="•"/>
+              <a:defRPr sz="1600" kern="1200">
+                <a:solidFill>
+                  <a:schemeClr val="tx1"/>
+                </a:solidFill>
+                <a:latin typeface="+mn-lt"/>
+                <a:ea typeface="+mn-ea"/>
+                <a:cs typeface="+mn-cs"/>
+              </a:defRPr>
+            </a:lvl5pPr>
+            <a:lvl6pPr marL="2514600" indent="-228600" algn="l" defTabSz="914400" rtl="0" eaLnBrk="1" latinLnBrk="0" hangingPunct="1">
+              <a:lnSpc>
+                <a:spcPct val="120000"/>
+              </a:lnSpc>
+              <a:spcBef>
+                <a:spcPts val="500"/>
+              </a:spcBef>
+              <a:buSzPct val="125000"/>
+              <a:buFont typeface="Arial" panose="020B0604020202020204" pitchFamily="34" charset="0"/>
+              <a:buChar char="•"/>
+              <a:defRPr sz="1400" kern="1200">
+                <a:solidFill>
+                  <a:schemeClr val="tx1"/>
+                </a:solidFill>
+                <a:latin typeface="+mn-lt"/>
+                <a:ea typeface="+mn-ea"/>
+                <a:cs typeface="+mn-cs"/>
+              </a:defRPr>
+            </a:lvl6pPr>
+            <a:lvl7pPr marL="2971800" indent="-228600" algn="l" defTabSz="914400" rtl="0" eaLnBrk="1" latinLnBrk="0" hangingPunct="1">
+              <a:lnSpc>
+                <a:spcPct val="120000"/>
+              </a:lnSpc>
+              <a:spcBef>
+                <a:spcPts val="500"/>
+              </a:spcBef>
+              <a:buSzPct val="125000"/>
+              <a:buFont typeface="Arial" panose="020B0604020202020204" pitchFamily="34" charset="0"/>
+              <a:buChar char="•"/>
+              <a:defRPr sz="1400" kern="1200">
+                <a:solidFill>
+                  <a:schemeClr val="tx1"/>
+                </a:solidFill>
+                <a:latin typeface="+mn-lt"/>
+                <a:ea typeface="+mn-ea"/>
+                <a:cs typeface="+mn-cs"/>
+              </a:defRPr>
+            </a:lvl7pPr>
+            <a:lvl8pPr marL="3429000" indent="-228600" algn="l" defTabSz="914400" rtl="0" eaLnBrk="1" latinLnBrk="0" hangingPunct="1">
+              <a:lnSpc>
+                <a:spcPct val="120000"/>
+              </a:lnSpc>
+              <a:spcBef>
+                <a:spcPts val="500"/>
+              </a:spcBef>
+              <a:buSzPct val="125000"/>
+              <a:buFont typeface="Arial" panose="020B0604020202020204" pitchFamily="34" charset="0"/>
+              <a:buChar char="•"/>
+              <a:defRPr sz="1400" kern="1200">
+                <a:solidFill>
+                  <a:schemeClr val="tx1"/>
+                </a:solidFill>
+                <a:latin typeface="+mn-lt"/>
+                <a:ea typeface="+mn-ea"/>
+                <a:cs typeface="+mn-cs"/>
+              </a:defRPr>
+            </a:lvl8pPr>
+            <a:lvl9pPr marL="3886200" indent="-228600" algn="l" defTabSz="914400" rtl="0" eaLnBrk="1" latinLnBrk="0" hangingPunct="1">
+              <a:lnSpc>
+                <a:spcPct val="120000"/>
+              </a:lnSpc>
+              <a:spcBef>
+                <a:spcPts val="500"/>
+              </a:spcBef>
+              <a:buSzPct val="125000"/>
+              <a:buFont typeface="Arial" panose="020B0604020202020204" pitchFamily="34" charset="0"/>
+              <a:buChar char="•"/>
+              <a:defRPr sz="1400" kern="1200">
+                <a:solidFill>
+                  <a:schemeClr val="tx1"/>
+                </a:solidFill>
+                <a:latin typeface="+mn-lt"/>
+                <a:ea typeface="+mn-ea"/>
+                <a:cs typeface="+mn-cs"/>
+              </a:defRPr>
+            </a:lvl9pPr>
+          </a:lstStyle>
+          <a:p>
+            <a:pPr marL="0" indent="0">
+              <a:buFont typeface="Arial" panose="020B0604020202020204" pitchFamily="34" charset="0"/>
+              <a:buNone/>
+            </a:pPr>
+            <a:r>
+              <a:rPr lang="sr-Latn-RS" dirty="0" smtClean="0"/>
+              <a:t>Novi:</a:t>
+            </a:r>
+          </a:p>
+          <a:p>
+            <a:r>
+              <a:rPr lang="sr-Latn-RS" dirty="0" smtClean="0"/>
+              <a:t>git init</a:t>
+            </a:r>
+          </a:p>
+          <a:p>
+            <a:r>
+              <a:rPr lang="sr-Latn-RS" dirty="0" smtClean="0"/>
+              <a:t>git commit –m „prvi commit“</a:t>
+            </a:r>
+          </a:p>
+          <a:p>
+            <a:r>
+              <a:rPr lang="sr-Latn-RS" dirty="0" smtClean="0"/>
+              <a:t>git remote add origin &lt;url&gt;</a:t>
+            </a:r>
+          </a:p>
+          <a:p>
+            <a:r>
+              <a:rPr lang="sr-Latn-RS" dirty="0" smtClean="0"/>
+              <a:t>git push –u origin master</a:t>
+            </a:r>
+            <a:endParaRPr lang="en-US" dirty="0"/>
+          </a:p>
+        </p:txBody>
+      </p:sp>
+    </p:spTree>
+    <p:extLst>
+      <p:ext uri="{BB962C8B-B14F-4D97-AF65-F5344CB8AC3E}">
+        <p14:creationId xmlns:p14="http://schemas.microsoft.com/office/powerpoint/2010/main" val="3067054400"/>
+      </p:ext>
+    </p:extLst>
+  </p:cSld>
+  <p:clrMapOvr>
+    <a:masterClrMapping/>
+  </p:clrMapOvr>
+</p:sld>
+</file>
+
+<file path=ppt/slides/slide26.xml><?xml version="1.0" encoding="utf-8"?>
+<p:sld xmlns:a="http://schemas.openxmlformats.org/drawingml/2006/main" xmlns:r="http://schemas.openxmlformats.org/officeDocument/2006/relationships" xmlns:p="http://schemas.openxmlformats.org/presentationml/2006/main">
+  <p:cSld>
+    <p:spTree>
+      <p:nvGrpSpPr>
+        <p:cNvPr id="1" name=""/>
+        <p:cNvGrpSpPr/>
+        <p:nvPr/>
+      </p:nvGrpSpPr>
+      <p:grpSpPr>
+        <a:xfrm>
+          <a:off x="0" y="0"/>
+          <a:ext cx="0" cy="0"/>
+          <a:chOff x="0" y="0"/>
+          <a:chExt cx="0" cy="0"/>
+        </a:xfrm>
+      </p:grpSpPr>
+      <p:sp>
+        <p:nvSpPr>
+          <p:cNvPr id="2" name="Title 1"/>
+          <p:cNvSpPr>
+            <a:spLocks noGrp="1"/>
+          </p:cNvSpPr>
+          <p:nvPr>
+            <p:ph type="title"/>
+          </p:nvPr>
+        </p:nvSpPr>
+        <p:spPr/>
+        <p:txBody>
+          <a:bodyPr/>
+          <a:lstStyle/>
+          <a:p>
+            <a:r>
+              <a:rPr lang="sr-Latn-RS" dirty="0" smtClean="0"/>
+              <a:t>PREGLED githuba</a:t>
+            </a:r>
+            <a:endParaRPr lang="en-US" dirty="0"/>
+          </a:p>
+        </p:txBody>
+      </p:sp>
+      <p:sp>
+        <p:nvSpPr>
+          <p:cNvPr id="3" name="Content Placeholder 2"/>
+          <p:cNvSpPr>
+            <a:spLocks noGrp="1"/>
+          </p:cNvSpPr>
+          <p:nvPr>
+            <p:ph idx="1"/>
+          </p:nvPr>
+        </p:nvSpPr>
+        <p:spPr>
+          <a:xfrm>
+            <a:off x="1141413" y="2249487"/>
+            <a:ext cx="3686620" cy="3541714"/>
+          </a:xfrm>
+        </p:spPr>
+        <p:txBody>
+          <a:bodyPr>
+            <a:normAutofit/>
+          </a:bodyPr>
+          <a:lstStyle/>
+          <a:p>
+            <a:r>
+              <a:rPr lang="sr-Latn-RS" dirty="0" smtClean="0"/>
+              <a:t>Nalog</a:t>
+            </a:r>
+          </a:p>
+          <a:p>
+            <a:r>
+              <a:rPr lang="sr-Latn-RS" dirty="0" smtClean="0"/>
+              <a:t>Lista repozitorijuma</a:t>
+            </a:r>
+          </a:p>
+          <a:p>
+            <a:r>
+              <a:rPr lang="sr-Latn-RS" dirty="0" smtClean="0"/>
+              <a:t>Repozitorijum</a:t>
+            </a:r>
+          </a:p>
+          <a:p>
+            <a:r>
+              <a:rPr lang="sr-Latn-RS" dirty="0" smtClean="0"/>
+              <a:t>Grane</a:t>
+            </a:r>
+          </a:p>
+          <a:p>
+            <a:r>
+              <a:rPr lang="sr-Latn-RS" dirty="0" smtClean="0"/>
+              <a:t>Commits</a:t>
+            </a:r>
+          </a:p>
+        </p:txBody>
+      </p:sp>
+    </p:spTree>
+    <p:extLst>
+      <p:ext uri="{BB962C8B-B14F-4D97-AF65-F5344CB8AC3E}">
+        <p14:creationId xmlns:p14="http://schemas.microsoft.com/office/powerpoint/2010/main" val="3135178197"/>
+      </p:ext>
+    </p:extLst>
+  </p:cSld>
+  <p:clrMapOvr>
+    <a:masterClrMapping/>
+  </p:clrMapOvr>
+</p:sld>
+</file>
+
+<file path=ppt/slides/slide27.xml><?xml version="1.0" encoding="utf-8"?>
+<p:sld xmlns:a="http://schemas.openxmlformats.org/drawingml/2006/main" xmlns:r="http://schemas.openxmlformats.org/officeDocument/2006/relationships" xmlns:p="http://schemas.openxmlformats.org/presentationml/2006/main">
+  <p:cSld>
+    <p:spTree>
+      <p:nvGrpSpPr>
+        <p:cNvPr id="1" name=""/>
+        <p:cNvGrpSpPr/>
+        <p:nvPr/>
+      </p:nvGrpSpPr>
+      <p:grpSpPr>
+        <a:xfrm>
+          <a:off x="0" y="0"/>
+          <a:ext cx="0" cy="0"/>
+          <a:chOff x="0" y="0"/>
+          <a:chExt cx="0" cy="0"/>
+        </a:xfrm>
+      </p:grpSpPr>
+      <p:sp>
+        <p:nvSpPr>
+          <p:cNvPr id="2" name="Title 1"/>
+          <p:cNvSpPr>
+            <a:spLocks noGrp="1"/>
+          </p:cNvSpPr>
+          <p:nvPr>
+            <p:ph type="title"/>
+          </p:nvPr>
+        </p:nvSpPr>
+        <p:spPr/>
+        <p:txBody>
+          <a:bodyPr/>
+          <a:lstStyle/>
+          <a:p>
+            <a:r>
+              <a:rPr lang="sr-Latn-RS" dirty="0" smtClean="0"/>
+              <a:t>Slanje lokalnih izmena na github</a:t>
+            </a:r>
+            <a:endParaRPr lang="en-US" dirty="0"/>
+          </a:p>
+        </p:txBody>
+      </p:sp>
+      <p:sp>
+        <p:nvSpPr>
+          <p:cNvPr id="3" name="Content Placeholder 2"/>
+          <p:cNvSpPr>
+            <a:spLocks noGrp="1"/>
+          </p:cNvSpPr>
+          <p:nvPr>
+            <p:ph idx="1"/>
+          </p:nvPr>
+        </p:nvSpPr>
+        <p:spPr/>
+        <p:txBody>
+          <a:bodyPr/>
+          <a:lstStyle/>
+          <a:p>
+            <a:r>
+              <a:rPr lang="sr-Latn-RS" dirty="0" smtClean="0"/>
+              <a:t>git push</a:t>
+            </a:r>
+            <a:endParaRPr lang="en-US" dirty="0"/>
+          </a:p>
+        </p:txBody>
+      </p:sp>
+    </p:spTree>
+    <p:extLst>
+      <p:ext uri="{BB962C8B-B14F-4D97-AF65-F5344CB8AC3E}">
+        <p14:creationId xmlns:p14="http://schemas.microsoft.com/office/powerpoint/2010/main" val="1746093552"/>
+      </p:ext>
+    </p:extLst>
+  </p:cSld>
+  <p:clrMapOvr>
+    <a:masterClrMapping/>
+  </p:clrMapOvr>
+</p:sld>
+</file>
+
+<file path=ppt/slides/slide28.xml><?xml version="1.0" encoding="utf-8"?>
+<p:sld xmlns:a="http://schemas.openxmlformats.org/drawingml/2006/main" xmlns:r="http://schemas.openxmlformats.org/officeDocument/2006/relationships" xmlns:p="http://schemas.openxmlformats.org/presentationml/2006/main">
+  <p:cSld>
+    <p:spTree>
+      <p:nvGrpSpPr>
+        <p:cNvPr id="1" name=""/>
+        <p:cNvGrpSpPr/>
+        <p:nvPr/>
+      </p:nvGrpSpPr>
+      <p:grpSpPr>
+        <a:xfrm>
+          <a:off x="0" y="0"/>
+          <a:ext cx="0" cy="0"/>
+          <a:chOff x="0" y="0"/>
+          <a:chExt cx="0" cy="0"/>
+        </a:xfrm>
+      </p:grpSpPr>
+      <p:sp>
+        <p:nvSpPr>
+          <p:cNvPr id="2" name="Title 1"/>
+          <p:cNvSpPr>
+            <a:spLocks noGrp="1"/>
+          </p:cNvSpPr>
+          <p:nvPr>
+            <p:ph type="title"/>
+          </p:nvPr>
+        </p:nvSpPr>
+        <p:spPr/>
+        <p:txBody>
+          <a:bodyPr/>
+          <a:lstStyle/>
+          <a:p>
+            <a:r>
+              <a:rPr lang="sr-Latn-RS" dirty="0" smtClean="0"/>
+              <a:t>PREUZIMANJE izmena sa github-a LOKALNO</a:t>
+            </a:r>
+            <a:endParaRPr lang="en-US" dirty="0"/>
+          </a:p>
+        </p:txBody>
+      </p:sp>
+      <p:sp>
+        <p:nvSpPr>
+          <p:cNvPr id="3" name="Content Placeholder 2"/>
+          <p:cNvSpPr>
+            <a:spLocks noGrp="1"/>
+          </p:cNvSpPr>
+          <p:nvPr>
+            <p:ph idx="1"/>
+          </p:nvPr>
+        </p:nvSpPr>
+        <p:spPr/>
+        <p:txBody>
+          <a:bodyPr/>
+          <a:lstStyle/>
+          <a:p>
+            <a:r>
+              <a:rPr lang="sr-Latn-RS" dirty="0" smtClean="0"/>
+              <a:t>git pull</a:t>
+            </a:r>
+            <a:endParaRPr lang="en-US" dirty="0"/>
+          </a:p>
+        </p:txBody>
+      </p:sp>
+    </p:spTree>
+    <p:extLst>
+      <p:ext uri="{BB962C8B-B14F-4D97-AF65-F5344CB8AC3E}">
+        <p14:creationId xmlns:p14="http://schemas.microsoft.com/office/powerpoint/2010/main" val="3348365950"/>
+      </p:ext>
+    </p:extLst>
+  </p:cSld>
+  <p:clrMapOvr>
+    <a:masterClrMapping/>
+  </p:clrMapOvr>
+</p:sld>
+</file>
+
+<file path=ppt/slides/slide29.xml><?xml version="1.0" encoding="utf-8"?>
+<p:sld xmlns:a="http://schemas.openxmlformats.org/drawingml/2006/main" xmlns:r="http://schemas.openxmlformats.org/officeDocument/2006/relationships" xmlns:p="http://schemas.openxmlformats.org/presentationml/2006/main">
+  <p:cSld>
+    <p:spTree>
+      <p:nvGrpSpPr>
+        <p:cNvPr id="1" name=""/>
+        <p:cNvGrpSpPr/>
+        <p:nvPr/>
+      </p:nvGrpSpPr>
+      <p:grpSpPr>
+        <a:xfrm>
+          <a:off x="0" y="0"/>
+          <a:ext cx="0" cy="0"/>
+          <a:chOff x="0" y="0"/>
+          <a:chExt cx="0" cy="0"/>
+        </a:xfrm>
+      </p:grpSpPr>
+      <p:sp>
+        <p:nvSpPr>
+          <p:cNvPr id="2" name="Title 1"/>
+          <p:cNvSpPr>
+            <a:spLocks noGrp="1"/>
+          </p:cNvSpPr>
+          <p:nvPr>
+            <p:ph type="title"/>
+          </p:nvPr>
+        </p:nvSpPr>
+        <p:spPr/>
+        <p:txBody>
+          <a:bodyPr/>
+          <a:lstStyle/>
+          <a:p>
+            <a:r>
+              <a:rPr lang="sr-Latn-RS" dirty="0" smtClean="0"/>
+              <a:t>Kloniranje github repozitorijuma</a:t>
+            </a:r>
+            <a:endParaRPr lang="en-US" dirty="0"/>
+          </a:p>
+        </p:txBody>
+      </p:sp>
+      <p:sp>
+        <p:nvSpPr>
+          <p:cNvPr id="3" name="Content Placeholder 2"/>
+          <p:cNvSpPr>
+            <a:spLocks noGrp="1"/>
+          </p:cNvSpPr>
+          <p:nvPr>
+            <p:ph idx="1"/>
+          </p:nvPr>
+        </p:nvSpPr>
+        <p:spPr/>
+        <p:txBody>
+          <a:bodyPr/>
+          <a:lstStyle/>
+          <a:p>
+            <a:r>
+              <a:rPr lang="sr-Latn-RS" dirty="0" smtClean="0"/>
+              <a:t>git clone &lt;url&gt;</a:t>
+            </a:r>
+            <a:endParaRPr lang="en-US" dirty="0"/>
+          </a:p>
+        </p:txBody>
+      </p:sp>
+    </p:spTree>
+    <p:extLst>
+      <p:ext uri="{BB962C8B-B14F-4D97-AF65-F5344CB8AC3E}">
+        <p14:creationId xmlns:p14="http://schemas.microsoft.com/office/powerpoint/2010/main" val="804800930"/>
       </p:ext>
     </p:extLst>
   </p:cSld>
@@ -12586,7 +14499,526 @@
           <p:cNvPr id="2" name="Title 1">
             <a:extLst>
               <a:ext uri="{FF2B5EF4-FFF2-40B4-BE49-F238E27FC236}">
-                <a16:creationId xmlns:a16="http://schemas.microsoft.com/office/drawing/2014/main" id="{D1980439-8C72-B2F8-6552-D27CFBF1E756}"/>
+                <a16:creationId xmlns:a16="http://schemas.microsoft.com/office/drawing/2014/main" xmlns="" id="{0C2DF7B5-0F0A-86C2-D79A-CC60A88C4BFB}"/>
+              </a:ext>
+            </a:extLst>
+          </p:cNvPr>
+          <p:cNvSpPr>
+            <a:spLocks noGrp="1"/>
+          </p:cNvSpPr>
+          <p:nvPr>
+            <p:ph type="title"/>
+          </p:nvPr>
+        </p:nvSpPr>
+        <p:spPr/>
+        <p:txBody>
+          <a:bodyPr/>
+          <a:lstStyle/>
+          <a:p>
+            <a:r>
+              <a:rPr lang="sr-Latn-RS" dirty="0"/>
+              <a:t>Šta je git?</a:t>
+            </a:r>
+            <a:endParaRPr lang="en-US" dirty="0"/>
+          </a:p>
+        </p:txBody>
+      </p:sp>
+      <p:sp>
+        <p:nvSpPr>
+          <p:cNvPr id="3" name="TextBox 2">
+            <a:extLst>
+              <a:ext uri="{FF2B5EF4-FFF2-40B4-BE49-F238E27FC236}">
+                <a16:creationId xmlns:a16="http://schemas.microsoft.com/office/drawing/2014/main" xmlns="" id="{87D4E6DF-85E8-C5FF-2EFD-032EAB7A3553}"/>
+              </a:ext>
+            </a:extLst>
+          </p:cNvPr>
+          <p:cNvSpPr txBox="1"/>
+          <p:nvPr/>
+        </p:nvSpPr>
+        <p:spPr>
+          <a:xfrm>
+            <a:off x="1141413" y="2097088"/>
+            <a:ext cx="9905998" cy="3108543"/>
+          </a:xfrm>
+          <a:prstGeom prst="rect">
+            <a:avLst/>
+          </a:prstGeom>
+          <a:noFill/>
+        </p:spPr>
+        <p:txBody>
+          <a:bodyPr wrap="square" rtlCol="0">
+            <a:spAutoFit/>
+          </a:bodyPr>
+          <a:lstStyle/>
+          <a:p>
+            <a:pPr marL="457200" indent="-457200">
+              <a:buFont typeface="Arial" panose="020B0604020202020204" pitchFamily="34" charset="0"/>
+              <a:buChar char="•"/>
+            </a:pPr>
+            <a:r>
+              <a:rPr lang="en-US" sz="2800" dirty="0"/>
+              <a:t>Decentralizovani sistem za kontrolu verzija </a:t>
+            </a:r>
+            <a:endParaRPr lang="sr-Latn-RS" sz="2800" dirty="0"/>
+          </a:p>
+          <a:p>
+            <a:pPr marL="457200" indent="-457200">
+              <a:buFont typeface="Arial" panose="020B0604020202020204" pitchFamily="34" charset="0"/>
+              <a:buChar char="•"/>
+            </a:pPr>
+            <a:r>
+              <a:rPr lang="en-US" sz="2800" dirty="0"/>
+              <a:t>Prati izmene</a:t>
+            </a:r>
+            <a:r>
+              <a:rPr lang="sr-Latn-RS" sz="2800" dirty="0"/>
+              <a:t> </a:t>
+            </a:r>
+            <a:r>
+              <a:rPr lang="en-US" sz="2800" dirty="0"/>
+              <a:t>fajlova u lokalnim repozitorijumima </a:t>
+            </a:r>
+            <a:endParaRPr lang="sr-Latn-RS" sz="2800" dirty="0"/>
+          </a:p>
+          <a:p>
+            <a:pPr marL="457200" indent="-457200">
+              <a:buFont typeface="Arial" panose="020B0604020202020204" pitchFamily="34" charset="0"/>
+              <a:buChar char="•"/>
+            </a:pPr>
+            <a:r>
+              <a:rPr lang="en-US" sz="2800" dirty="0"/>
+              <a:t>Omogućava kreiranje i pregled istorije promena, povratak na starije verzije</a:t>
+            </a:r>
+            <a:endParaRPr lang="sr-Latn-RS" sz="2800" dirty="0"/>
+          </a:p>
+          <a:p>
+            <a:pPr marL="457200" indent="-457200">
+              <a:buFont typeface="Arial" panose="020B0604020202020204" pitchFamily="34" charset="0"/>
+              <a:buChar char="•"/>
+            </a:pPr>
+            <a:r>
+              <a:rPr lang="en-US" sz="2800" dirty="0"/>
+              <a:t>Radi sa tekstualnim fajlovima - može verzionisati projekte u bilo kom programskom jeziku kao i bilo koje tekstualne fajlove</a:t>
+            </a:r>
+            <a:endParaRPr lang="sr-Latn-RS" sz="2800" dirty="0"/>
+          </a:p>
+          <a:p>
+            <a:pPr marL="457200" indent="-457200">
+              <a:buFont typeface="Arial" panose="020B0604020202020204" pitchFamily="34" charset="0"/>
+              <a:buChar char="•"/>
+            </a:pPr>
+            <a:r>
+              <a:rPr lang="en-US" sz="2800" dirty="0"/>
+              <a:t>Alat lokalno instaliran na računaru ≠ GitHub, GitLab, Bitbucket</a:t>
+            </a:r>
+          </a:p>
+        </p:txBody>
+      </p:sp>
+    </p:spTree>
+    <p:extLst>
+      <p:ext uri="{BB962C8B-B14F-4D97-AF65-F5344CB8AC3E}">
+        <p14:creationId xmlns:p14="http://schemas.microsoft.com/office/powerpoint/2010/main" val="82151746"/>
+      </p:ext>
+    </p:extLst>
+  </p:cSld>
+  <p:clrMapOvr>
+    <a:masterClrMapping/>
+  </p:clrMapOvr>
+</p:sld>
+</file>
+
+<file path=ppt/slides/slide30.xml><?xml version="1.0" encoding="utf-8"?>
+<p:sld xmlns:a="http://schemas.openxmlformats.org/drawingml/2006/main" xmlns:r="http://schemas.openxmlformats.org/officeDocument/2006/relationships" xmlns:p="http://schemas.openxmlformats.org/presentationml/2006/main">
+  <p:cSld>
+    <p:spTree>
+      <p:nvGrpSpPr>
+        <p:cNvPr id="1" name=""/>
+        <p:cNvGrpSpPr/>
+        <p:nvPr/>
+      </p:nvGrpSpPr>
+      <p:grpSpPr>
+        <a:xfrm>
+          <a:off x="0" y="0"/>
+          <a:ext cx="0" cy="0"/>
+          <a:chOff x="0" y="0"/>
+          <a:chExt cx="0" cy="0"/>
+        </a:xfrm>
+      </p:grpSpPr>
+      <p:sp>
+        <p:nvSpPr>
+          <p:cNvPr id="2" name="Title 1"/>
+          <p:cNvSpPr>
+            <a:spLocks noGrp="1"/>
+          </p:cNvSpPr>
+          <p:nvPr>
+            <p:ph type="title"/>
+          </p:nvPr>
+        </p:nvSpPr>
+        <p:spPr/>
+        <p:txBody>
+          <a:bodyPr/>
+          <a:lstStyle/>
+          <a:p>
+            <a:r>
+              <a:rPr lang="sr-Latn-RS" dirty="0" smtClean="0"/>
+              <a:t>PREGLED githuba</a:t>
+            </a:r>
+            <a:endParaRPr lang="en-US" dirty="0"/>
+          </a:p>
+        </p:txBody>
+      </p:sp>
+      <p:sp>
+        <p:nvSpPr>
+          <p:cNvPr id="4" name="Content Placeholder 2"/>
+          <p:cNvSpPr txBox="1">
+            <a:spLocks/>
+          </p:cNvSpPr>
+          <p:nvPr/>
+        </p:nvSpPr>
+        <p:spPr>
+          <a:xfrm>
+            <a:off x="1141413" y="2097088"/>
+            <a:ext cx="3686620" cy="3541714"/>
+          </a:xfrm>
+          <a:prstGeom prst="rect">
+            <a:avLst/>
+          </a:prstGeom>
+        </p:spPr>
+        <p:txBody>
+          <a:bodyPr vert="horz" lIns="91440" tIns="45720" rIns="91440" bIns="45720" rtlCol="0">
+            <a:normAutofit/>
+          </a:bodyPr>
+          <a:lstStyle>
+            <a:lvl1pPr marL="228600" indent="-228600" algn="l" defTabSz="914400" rtl="0" eaLnBrk="1" latinLnBrk="0" hangingPunct="1">
+              <a:lnSpc>
+                <a:spcPct val="120000"/>
+              </a:lnSpc>
+              <a:spcBef>
+                <a:spcPts val="1000"/>
+              </a:spcBef>
+              <a:buSzPct val="125000"/>
+              <a:buFont typeface="Arial" panose="020B0604020202020204" pitchFamily="34" charset="0"/>
+              <a:buChar char="•"/>
+              <a:defRPr sz="2400" kern="1200">
+                <a:solidFill>
+                  <a:schemeClr val="tx1"/>
+                </a:solidFill>
+                <a:latin typeface="+mn-lt"/>
+                <a:ea typeface="+mn-ea"/>
+                <a:cs typeface="+mn-cs"/>
+              </a:defRPr>
+            </a:lvl1pPr>
+            <a:lvl2pPr marL="685800" indent="-228600" algn="l" defTabSz="914400" rtl="0" eaLnBrk="1" latinLnBrk="0" hangingPunct="1">
+              <a:lnSpc>
+                <a:spcPct val="120000"/>
+              </a:lnSpc>
+              <a:spcBef>
+                <a:spcPts val="500"/>
+              </a:spcBef>
+              <a:buSzPct val="125000"/>
+              <a:buFont typeface="Arial" panose="020B0604020202020204" pitchFamily="34" charset="0"/>
+              <a:buChar char="•"/>
+              <a:defRPr sz="2000" kern="1200">
+                <a:solidFill>
+                  <a:schemeClr val="tx1"/>
+                </a:solidFill>
+                <a:latin typeface="+mn-lt"/>
+                <a:ea typeface="+mn-ea"/>
+                <a:cs typeface="+mn-cs"/>
+              </a:defRPr>
+            </a:lvl2pPr>
+            <a:lvl3pPr marL="1143000" indent="-228600" algn="l" defTabSz="914400" rtl="0" eaLnBrk="1" latinLnBrk="0" hangingPunct="1">
+              <a:lnSpc>
+                <a:spcPct val="120000"/>
+              </a:lnSpc>
+              <a:spcBef>
+                <a:spcPts val="500"/>
+              </a:spcBef>
+              <a:buSzPct val="125000"/>
+              <a:buFont typeface="Arial" panose="020B0604020202020204" pitchFamily="34" charset="0"/>
+              <a:buChar char="•"/>
+              <a:defRPr sz="1800" kern="1200">
+                <a:solidFill>
+                  <a:schemeClr val="tx1"/>
+                </a:solidFill>
+                <a:latin typeface="+mn-lt"/>
+                <a:ea typeface="+mn-ea"/>
+                <a:cs typeface="+mn-cs"/>
+              </a:defRPr>
+            </a:lvl3pPr>
+            <a:lvl4pPr marL="1600200" indent="-228600" algn="l" defTabSz="914400" rtl="0" eaLnBrk="1" latinLnBrk="0" hangingPunct="1">
+              <a:lnSpc>
+                <a:spcPct val="120000"/>
+              </a:lnSpc>
+              <a:spcBef>
+                <a:spcPts val="500"/>
+              </a:spcBef>
+              <a:buSzPct val="125000"/>
+              <a:buFont typeface="Arial" panose="020B0604020202020204" pitchFamily="34" charset="0"/>
+              <a:buChar char="•"/>
+              <a:defRPr sz="1600" kern="1200">
+                <a:solidFill>
+                  <a:schemeClr val="tx1"/>
+                </a:solidFill>
+                <a:latin typeface="+mn-lt"/>
+                <a:ea typeface="+mn-ea"/>
+                <a:cs typeface="+mn-cs"/>
+              </a:defRPr>
+            </a:lvl4pPr>
+            <a:lvl5pPr marL="2057400" indent="-228600" algn="l" defTabSz="914400" rtl="0" eaLnBrk="1" latinLnBrk="0" hangingPunct="1">
+              <a:lnSpc>
+                <a:spcPct val="120000"/>
+              </a:lnSpc>
+              <a:spcBef>
+                <a:spcPts val="500"/>
+              </a:spcBef>
+              <a:buSzPct val="125000"/>
+              <a:buFont typeface="Arial" panose="020B0604020202020204" pitchFamily="34" charset="0"/>
+              <a:buChar char="•"/>
+              <a:defRPr sz="1600" kern="1200">
+                <a:solidFill>
+                  <a:schemeClr val="tx1"/>
+                </a:solidFill>
+                <a:latin typeface="+mn-lt"/>
+                <a:ea typeface="+mn-ea"/>
+                <a:cs typeface="+mn-cs"/>
+              </a:defRPr>
+            </a:lvl5pPr>
+            <a:lvl6pPr marL="2514600" indent="-228600" algn="l" defTabSz="914400" rtl="0" eaLnBrk="1" latinLnBrk="0" hangingPunct="1">
+              <a:lnSpc>
+                <a:spcPct val="120000"/>
+              </a:lnSpc>
+              <a:spcBef>
+                <a:spcPts val="500"/>
+              </a:spcBef>
+              <a:buSzPct val="125000"/>
+              <a:buFont typeface="Arial" panose="020B0604020202020204" pitchFamily="34" charset="0"/>
+              <a:buChar char="•"/>
+              <a:defRPr sz="1400" kern="1200">
+                <a:solidFill>
+                  <a:schemeClr val="tx1"/>
+                </a:solidFill>
+                <a:latin typeface="+mn-lt"/>
+                <a:ea typeface="+mn-ea"/>
+                <a:cs typeface="+mn-cs"/>
+              </a:defRPr>
+            </a:lvl6pPr>
+            <a:lvl7pPr marL="2971800" indent="-228600" algn="l" defTabSz="914400" rtl="0" eaLnBrk="1" latinLnBrk="0" hangingPunct="1">
+              <a:lnSpc>
+                <a:spcPct val="120000"/>
+              </a:lnSpc>
+              <a:spcBef>
+                <a:spcPts val="500"/>
+              </a:spcBef>
+              <a:buSzPct val="125000"/>
+              <a:buFont typeface="Arial" panose="020B0604020202020204" pitchFamily="34" charset="0"/>
+              <a:buChar char="•"/>
+              <a:defRPr sz="1400" kern="1200">
+                <a:solidFill>
+                  <a:schemeClr val="tx1"/>
+                </a:solidFill>
+                <a:latin typeface="+mn-lt"/>
+                <a:ea typeface="+mn-ea"/>
+                <a:cs typeface="+mn-cs"/>
+              </a:defRPr>
+            </a:lvl7pPr>
+            <a:lvl8pPr marL="3429000" indent="-228600" algn="l" defTabSz="914400" rtl="0" eaLnBrk="1" latinLnBrk="0" hangingPunct="1">
+              <a:lnSpc>
+                <a:spcPct val="120000"/>
+              </a:lnSpc>
+              <a:spcBef>
+                <a:spcPts val="500"/>
+              </a:spcBef>
+              <a:buSzPct val="125000"/>
+              <a:buFont typeface="Arial" panose="020B0604020202020204" pitchFamily="34" charset="0"/>
+              <a:buChar char="•"/>
+              <a:defRPr sz="1400" kern="1200">
+                <a:solidFill>
+                  <a:schemeClr val="tx1"/>
+                </a:solidFill>
+                <a:latin typeface="+mn-lt"/>
+                <a:ea typeface="+mn-ea"/>
+                <a:cs typeface="+mn-cs"/>
+              </a:defRPr>
+            </a:lvl8pPr>
+            <a:lvl9pPr marL="3886200" indent="-228600" algn="l" defTabSz="914400" rtl="0" eaLnBrk="1" latinLnBrk="0" hangingPunct="1">
+              <a:lnSpc>
+                <a:spcPct val="120000"/>
+              </a:lnSpc>
+              <a:spcBef>
+                <a:spcPts val="500"/>
+              </a:spcBef>
+              <a:buSzPct val="125000"/>
+              <a:buFont typeface="Arial" panose="020B0604020202020204" pitchFamily="34" charset="0"/>
+              <a:buChar char="•"/>
+              <a:defRPr sz="1400" kern="1200">
+                <a:solidFill>
+                  <a:schemeClr val="tx1"/>
+                </a:solidFill>
+                <a:latin typeface="+mn-lt"/>
+                <a:ea typeface="+mn-ea"/>
+                <a:cs typeface="+mn-cs"/>
+              </a:defRPr>
+            </a:lvl9pPr>
+          </a:lstStyle>
+          <a:p>
+            <a:r>
+              <a:rPr lang="sr-Latn-RS" dirty="0" smtClean="0"/>
+              <a:t>Issues</a:t>
+            </a:r>
+          </a:p>
+          <a:p>
+            <a:r>
+              <a:rPr lang="sr-Latn-RS" dirty="0" smtClean="0"/>
+              <a:t>Pull </a:t>
+            </a:r>
+            <a:r>
+              <a:rPr lang="sr-Latn-RS" dirty="0"/>
+              <a:t>requests</a:t>
+            </a:r>
+          </a:p>
+          <a:p>
+            <a:r>
+              <a:rPr lang="sr-Latn-RS" dirty="0"/>
+              <a:t>Settings</a:t>
+            </a:r>
+          </a:p>
+          <a:p>
+            <a:pPr lvl="1"/>
+            <a:r>
+              <a:rPr lang="sr-Latn-RS" dirty="0"/>
+              <a:t>Kolaboratori</a:t>
+            </a:r>
+          </a:p>
+          <a:p>
+            <a:pPr lvl="1"/>
+            <a:r>
+              <a:rPr lang="sr-Latn-RS" dirty="0"/>
+              <a:t>Promena vidljivosti</a:t>
+            </a:r>
+          </a:p>
+          <a:p>
+            <a:pPr lvl="1"/>
+            <a:r>
+              <a:rPr lang="sr-Latn-RS" dirty="0"/>
+              <a:t>Preimenovanje</a:t>
+            </a:r>
+          </a:p>
+          <a:p>
+            <a:pPr lvl="1"/>
+            <a:r>
+              <a:rPr lang="sr-Latn-RS" dirty="0"/>
+              <a:t>Brisanje</a:t>
+            </a:r>
+          </a:p>
+          <a:p>
+            <a:endParaRPr lang="sr-Latn-RS" dirty="0" smtClean="0"/>
+          </a:p>
+        </p:txBody>
+      </p:sp>
+    </p:spTree>
+    <p:extLst>
+      <p:ext uri="{BB962C8B-B14F-4D97-AF65-F5344CB8AC3E}">
+        <p14:creationId xmlns:p14="http://schemas.microsoft.com/office/powerpoint/2010/main" val="3383740716"/>
+      </p:ext>
+    </p:extLst>
+  </p:cSld>
+  <p:clrMapOvr>
+    <a:masterClrMapping/>
+  </p:clrMapOvr>
+</p:sld>
+</file>
+
+<file path=ppt/slides/slide31.xml><?xml version="1.0" encoding="utf-8"?>
+<p:sld xmlns:a="http://schemas.openxmlformats.org/drawingml/2006/main" xmlns:r="http://schemas.openxmlformats.org/officeDocument/2006/relationships" xmlns:p="http://schemas.openxmlformats.org/presentationml/2006/main">
+  <p:cSld>
+    <p:spTree>
+      <p:nvGrpSpPr>
+        <p:cNvPr id="1" name=""/>
+        <p:cNvGrpSpPr/>
+        <p:nvPr/>
+      </p:nvGrpSpPr>
+      <p:grpSpPr>
+        <a:xfrm>
+          <a:off x="0" y="0"/>
+          <a:ext cx="0" cy="0"/>
+          <a:chOff x="0" y="0"/>
+          <a:chExt cx="0" cy="0"/>
+        </a:xfrm>
+      </p:grpSpPr>
+      <p:sp>
+        <p:nvSpPr>
+          <p:cNvPr id="6" name="Title 1">
+            <a:extLst>
+              <a:ext uri="{FF2B5EF4-FFF2-40B4-BE49-F238E27FC236}">
+                <a16:creationId xmlns:a16="http://schemas.microsoft.com/office/drawing/2014/main" xmlns="" id="{0C0D7024-D493-6E2E-6CCD-8A30C9D1848D}"/>
+              </a:ext>
+            </a:extLst>
+          </p:cNvPr>
+          <p:cNvSpPr>
+            <a:spLocks noGrp="1"/>
+          </p:cNvSpPr>
+          <p:nvPr>
+            <p:ph type="title"/>
+          </p:nvPr>
+        </p:nvSpPr>
+        <p:spPr>
+          <a:xfrm>
+            <a:off x="1143001" y="2473822"/>
+            <a:ext cx="9905998" cy="1478570"/>
+          </a:xfrm>
+        </p:spPr>
+        <p:txBody>
+          <a:bodyPr>
+            <a:normAutofit/>
+          </a:bodyPr>
+          <a:lstStyle/>
+          <a:p>
+            <a:pPr algn="ctr"/>
+            <a:r>
+              <a:rPr lang="sr-Latn-RS" sz="4400" dirty="0" smtClean="0"/>
+              <a:t>VS CODE</a:t>
+            </a:r>
+            <a:endParaRPr lang="en-US" sz="4400" dirty="0"/>
+          </a:p>
+        </p:txBody>
+      </p:sp>
+    </p:spTree>
+    <p:extLst>
+      <p:ext uri="{BB962C8B-B14F-4D97-AF65-F5344CB8AC3E}">
+        <p14:creationId xmlns:p14="http://schemas.microsoft.com/office/powerpoint/2010/main" val="2377659989"/>
+      </p:ext>
+    </p:extLst>
+  </p:cSld>
+  <p:clrMapOvr>
+    <a:masterClrMapping/>
+  </p:clrMapOvr>
+</p:sld>
+</file>
+
+<file path=ppt/slides/slide4.xml><?xml version="1.0" encoding="utf-8"?>
+<p:sld xmlns:a="http://schemas.openxmlformats.org/drawingml/2006/main" xmlns:r="http://schemas.openxmlformats.org/officeDocument/2006/relationships" xmlns:p="http://schemas.openxmlformats.org/presentationml/2006/main">
+  <p:cSld>
+    <p:spTree>
+      <p:nvGrpSpPr>
+        <p:cNvPr id="1" name=""/>
+        <p:cNvGrpSpPr/>
+        <p:nvPr/>
+      </p:nvGrpSpPr>
+      <p:grpSpPr>
+        <a:xfrm>
+          <a:off x="0" y="0"/>
+          <a:ext cx="0" cy="0"/>
+          <a:chOff x="0" y="0"/>
+          <a:chExt cx="0" cy="0"/>
+        </a:xfrm>
+      </p:grpSpPr>
+      <p:sp>
+        <p:nvSpPr>
+          <p:cNvPr id="2" name="Title 1">
+            <a:extLst>
+              <a:ext uri="{FF2B5EF4-FFF2-40B4-BE49-F238E27FC236}">
+                <a16:creationId xmlns:a16="http://schemas.microsoft.com/office/drawing/2014/main" xmlns="" id="{D1980439-8C72-B2F8-6552-D27CFBF1E756}"/>
               </a:ext>
             </a:extLst>
           </p:cNvPr>
@@ -12615,7 +15047,7 @@
           <p:cNvPr id="13" name="Picture 12">
             <a:extLst>
               <a:ext uri="{FF2B5EF4-FFF2-40B4-BE49-F238E27FC236}">
-                <a16:creationId xmlns:a16="http://schemas.microsoft.com/office/drawing/2014/main" id="{51B42E6F-5203-BA2C-C801-BA073BC8D25A}"/>
+                <a16:creationId xmlns:a16="http://schemas.microsoft.com/office/drawing/2014/main" xmlns="" id="{51B42E6F-5203-BA2C-C801-BA073BC8D25A}"/>
               </a:ext>
             </a:extLst>
           </p:cNvPr>
@@ -12645,7 +15077,7 @@
           <p:cNvPr id="1028" name="Picture 4" descr="github - Me using git - devRant">
             <a:extLst>
               <a:ext uri="{FF2B5EF4-FFF2-40B4-BE49-F238E27FC236}">
-                <a16:creationId xmlns:a16="http://schemas.microsoft.com/office/drawing/2014/main" id="{2C68084B-733B-BE2C-C8B0-23B1D1A06201}"/>
+                <a16:creationId xmlns:a16="http://schemas.microsoft.com/office/drawing/2014/main" xmlns="" id="{2C68084B-733B-BE2C-C8B0-23B1D1A06201}"/>
               </a:ext>
             </a:extLst>
           </p:cNvPr>
@@ -12700,156 +15132,6 @@
 </p:sld>
 </file>
 
-<file path=ppt/slides/slide4.xml><?xml version="1.0" encoding="utf-8"?>
-<p:sld xmlns:a="http://schemas.openxmlformats.org/drawingml/2006/main" xmlns:r="http://schemas.openxmlformats.org/officeDocument/2006/relationships" xmlns:p="http://schemas.openxmlformats.org/presentationml/2006/main">
-  <p:cSld>
-    <p:spTree>
-      <p:nvGrpSpPr>
-        <p:cNvPr id="1" name=""/>
-        <p:cNvGrpSpPr/>
-        <p:nvPr/>
-      </p:nvGrpSpPr>
-      <p:grpSpPr>
-        <a:xfrm>
-          <a:off x="0" y="0"/>
-          <a:ext cx="0" cy="0"/>
-          <a:chOff x="0" y="0"/>
-          <a:chExt cx="0" cy="0"/>
-        </a:xfrm>
-      </p:grpSpPr>
-      <p:sp>
-        <p:nvSpPr>
-          <p:cNvPr id="2" name="Title 1">
-            <a:extLst>
-              <a:ext uri="{FF2B5EF4-FFF2-40B4-BE49-F238E27FC236}">
-                <a16:creationId xmlns:a16="http://schemas.microsoft.com/office/drawing/2014/main" id="{0C2DF7B5-0F0A-86C2-D79A-CC60A88C4BFB}"/>
-              </a:ext>
-            </a:extLst>
-          </p:cNvPr>
-          <p:cNvSpPr>
-            <a:spLocks noGrp="1"/>
-          </p:cNvSpPr>
-          <p:nvPr>
-            <p:ph type="title"/>
-          </p:nvPr>
-        </p:nvSpPr>
-        <p:spPr/>
-        <p:txBody>
-          <a:bodyPr/>
-          <a:lstStyle/>
-          <a:p>
-            <a:r>
-              <a:rPr lang="sr-Latn-RS" dirty="0"/>
-              <a:t>Šta je git?</a:t>
-            </a:r>
-            <a:endParaRPr lang="en-US" dirty="0"/>
-          </a:p>
-        </p:txBody>
-      </p:sp>
-      <p:sp>
-        <p:nvSpPr>
-          <p:cNvPr id="3" name="TextBox 2">
-            <a:extLst>
-              <a:ext uri="{FF2B5EF4-FFF2-40B4-BE49-F238E27FC236}">
-                <a16:creationId xmlns:a16="http://schemas.microsoft.com/office/drawing/2014/main" id="{87D4E6DF-85E8-C5FF-2EFD-032EAB7A3553}"/>
-              </a:ext>
-            </a:extLst>
-          </p:cNvPr>
-          <p:cNvSpPr txBox="1"/>
-          <p:nvPr/>
-        </p:nvSpPr>
-        <p:spPr>
-          <a:xfrm>
-            <a:off x="1141413" y="2097088"/>
-            <a:ext cx="9905998" cy="3108543"/>
-          </a:xfrm>
-          <a:prstGeom prst="rect">
-            <a:avLst/>
-          </a:prstGeom>
-          <a:noFill/>
-        </p:spPr>
-        <p:txBody>
-          <a:bodyPr wrap="square" rtlCol="0">
-            <a:spAutoFit/>
-          </a:bodyPr>
-          <a:lstStyle/>
-          <a:p>
-            <a:pPr marL="457200" indent="-457200">
-              <a:buFont typeface="Arial" panose="020B0604020202020204" pitchFamily="34" charset="0"/>
-              <a:buChar char="•"/>
-            </a:pPr>
-            <a:r>
-              <a:rPr lang="en-US" sz="2800" dirty="0"/>
-              <a:t>Decentralizovani sistem za kontrolu verzija </a:t>
-            </a:r>
-            <a:endParaRPr lang="sr-Latn-RS" sz="2800" dirty="0"/>
-          </a:p>
-          <a:p>
-            <a:pPr marL="457200" indent="-457200">
-              <a:buFont typeface="Arial" panose="020B0604020202020204" pitchFamily="34" charset="0"/>
-              <a:buChar char="•"/>
-            </a:pPr>
-            <a:r>
-              <a:rPr lang="en-US" sz="2800" dirty="0"/>
-              <a:t>Prati izmene</a:t>
-            </a:r>
-            <a:r>
-              <a:rPr lang="sr-Latn-RS" sz="2800" dirty="0"/>
-              <a:t> </a:t>
-            </a:r>
-            <a:r>
-              <a:rPr lang="en-US" sz="2800" dirty="0"/>
-              <a:t>fajlova u lokalnim repozitorijumima </a:t>
-            </a:r>
-            <a:endParaRPr lang="sr-Latn-RS" sz="2800" dirty="0"/>
-          </a:p>
-          <a:p>
-            <a:pPr marL="457200" indent="-457200">
-              <a:buFont typeface="Arial" panose="020B0604020202020204" pitchFamily="34" charset="0"/>
-              <a:buChar char="•"/>
-            </a:pPr>
-            <a:r>
-              <a:rPr lang="en-US" sz="2800" dirty="0"/>
-              <a:t>Omogućava kreiranje i pregled istorije promena, povratak na starije verzije</a:t>
-            </a:r>
-            <a:endParaRPr lang="sr-Latn-RS" sz="2800" dirty="0"/>
-          </a:p>
-          <a:p>
-            <a:pPr marL="457200" indent="-457200">
-              <a:buFont typeface="Arial" panose="020B0604020202020204" pitchFamily="34" charset="0"/>
-              <a:buChar char="•"/>
-            </a:pPr>
-            <a:r>
-              <a:rPr lang="en-US" sz="2800" dirty="0"/>
-              <a:t>Radi sa tekstualnim fajlovima - može verzionisati projekte u bilo kom programskom jeziku kao i bilo koje tekstualne fajlove</a:t>
-            </a:r>
-            <a:endParaRPr lang="sr-Latn-RS" sz="2800" dirty="0"/>
-          </a:p>
-          <a:p>
-            <a:pPr marL="457200" indent="-457200">
-              <a:buFont typeface="Arial" panose="020B0604020202020204" pitchFamily="34" charset="0"/>
-              <a:buChar char="•"/>
-            </a:pPr>
-            <a:r>
-              <a:rPr lang="en-US" sz="2800" dirty="0"/>
-              <a:t>Alat lokalno instaliran na računaru ≠ GitHub, GitLab, Bitbucket</a:t>
-            </a:r>
-          </a:p>
-        </p:txBody>
-      </p:sp>
-    </p:spTree>
-    <p:extLst>
-      <p:ext uri="{BB962C8B-B14F-4D97-AF65-F5344CB8AC3E}">
-        <p14:creationId xmlns:p14="http://schemas.microsoft.com/office/powerpoint/2010/main" val="82151746"/>
-      </p:ext>
-    </p:extLst>
-  </p:cSld>
-  <p:clrMapOvr>
-    <a:masterClrMapping/>
-  </p:clrMapOvr>
-</p:sld>
-</file>
-
 <file path=ppt/slides/slide5.xml><?xml version="1.0" encoding="utf-8"?>
 <p:sld xmlns:a="http://schemas.openxmlformats.org/drawingml/2006/main" xmlns:r="http://schemas.openxmlformats.org/officeDocument/2006/relationships" xmlns:p="http://schemas.openxmlformats.org/presentationml/2006/main">
   <p:cSld>
@@ -12872,7 +15154,7 @@
           <p:cNvPr id="2" name="Title 1">
             <a:extLst>
               <a:ext uri="{FF2B5EF4-FFF2-40B4-BE49-F238E27FC236}">
-                <a16:creationId xmlns:a16="http://schemas.microsoft.com/office/drawing/2014/main" id="{A8FCF124-934B-C0A4-3AB3-EB5C0330DD4E}"/>
+                <a16:creationId xmlns:a16="http://schemas.microsoft.com/office/drawing/2014/main" xmlns="" id="{A8FCF124-934B-C0A4-3AB3-EB5C0330DD4E}"/>
               </a:ext>
             </a:extLst>
           </p:cNvPr>
@@ -12901,7 +15183,7 @@
           <p:cNvPr id="3" name="Content Placeholder 2">
             <a:extLst>
               <a:ext uri="{FF2B5EF4-FFF2-40B4-BE49-F238E27FC236}">
-                <a16:creationId xmlns:a16="http://schemas.microsoft.com/office/drawing/2014/main" id="{573CBF79-52E9-0FFF-C14B-C0E2FF62CF05}"/>
+                <a16:creationId xmlns:a16="http://schemas.microsoft.com/office/drawing/2014/main" xmlns="" id="{573CBF79-52E9-0FFF-C14B-C0E2FF62CF05}"/>
               </a:ext>
             </a:extLst>
           </p:cNvPr>
@@ -12927,7 +15209,7 @@
                 <a:hlinkClick r:id="rId2">
                   <a:extLst>
                     <a:ext uri="{A12FA001-AC4F-418D-AE19-62706E023703}">
-                      <ahyp:hlinkClr xmlns:ahyp="http://schemas.microsoft.com/office/drawing/2018/hyperlinkcolor" val="tx"/>
+                      <ahyp:hlinkClr xmlns:ahyp="http://schemas.microsoft.com/office/drawing/2018/hyperlinkcolor" xmlns="" val="tx"/>
                     </a:ext>
                   </a:extLst>
                 </a:hlinkClick>
@@ -12942,6 +15224,689 @@
     <p:extLst>
       <p:ext uri="{BB962C8B-B14F-4D97-AF65-F5344CB8AC3E}">
         <p14:creationId xmlns:p14="http://schemas.microsoft.com/office/powerpoint/2010/main" val="1375414402"/>
+      </p:ext>
+    </p:extLst>
+  </p:cSld>
+  <p:clrMapOvr>
+    <a:masterClrMapping/>
+  </p:clrMapOvr>
+</p:sld>
+</file>
+
+<file path=ppt/slides/slide6.xml><?xml version="1.0" encoding="utf-8"?>
+<p:sld xmlns:a="http://schemas.openxmlformats.org/drawingml/2006/main" xmlns:r="http://schemas.openxmlformats.org/officeDocument/2006/relationships" xmlns:p="http://schemas.openxmlformats.org/presentationml/2006/main">
+  <p:cSld>
+    <p:spTree>
+      <p:nvGrpSpPr>
+        <p:cNvPr id="1" name=""/>
+        <p:cNvGrpSpPr/>
+        <p:nvPr/>
+      </p:nvGrpSpPr>
+      <p:grpSpPr>
+        <a:xfrm>
+          <a:off x="0" y="0"/>
+          <a:ext cx="0" cy="0"/>
+          <a:chOff x="0" y="0"/>
+          <a:chExt cx="0" cy="0"/>
+        </a:xfrm>
+      </p:grpSpPr>
+      <p:sp>
+        <p:nvSpPr>
+          <p:cNvPr id="2" name="Title 1"/>
+          <p:cNvSpPr>
+            <a:spLocks noGrp="1"/>
+          </p:cNvSpPr>
+          <p:nvPr>
+            <p:ph type="title"/>
+          </p:nvPr>
+        </p:nvSpPr>
+        <p:spPr/>
+        <p:txBody>
+          <a:bodyPr/>
+          <a:lstStyle/>
+          <a:p>
+            <a:r>
+              <a:rPr lang="sr-Latn-RS" dirty="0" smtClean="0"/>
+              <a:t>Stanje git fajlova</a:t>
+            </a:r>
+            <a:endParaRPr lang="en-US" dirty="0"/>
+          </a:p>
+        </p:txBody>
+      </p:sp>
+      <p:sp>
+        <p:nvSpPr>
+          <p:cNvPr id="3" name="Content Placeholder 2"/>
+          <p:cNvSpPr>
+            <a:spLocks noGrp="1"/>
+          </p:cNvSpPr>
+          <p:nvPr>
+            <p:ph idx="1"/>
+          </p:nvPr>
+        </p:nvSpPr>
+        <p:spPr>
+          <a:xfrm>
+            <a:off x="1141413" y="1719072"/>
+            <a:ext cx="5122228" cy="4584193"/>
+          </a:xfrm>
+        </p:spPr>
+        <p:txBody>
+          <a:bodyPr>
+            <a:normAutofit lnSpcReduction="10000"/>
+          </a:bodyPr>
+          <a:lstStyle/>
+          <a:p>
+            <a:r>
+              <a:rPr lang="en-US" dirty="0" err="1"/>
+              <a:t>Modifikovan</a:t>
+            </a:r>
+            <a:r>
+              <a:rPr lang="en-US" dirty="0"/>
+              <a:t> - </a:t>
+            </a:r>
+            <a:r>
+              <a:rPr lang="en-US" dirty="0" err="1"/>
+              <a:t>fajl</a:t>
+            </a:r>
+            <a:r>
+              <a:rPr lang="en-US" dirty="0"/>
+              <a:t> je </a:t>
+            </a:r>
+            <a:r>
+              <a:rPr lang="en-US" dirty="0" err="1"/>
+              <a:t>izmenjen</a:t>
+            </a:r>
+            <a:r>
+              <a:rPr lang="en-US" dirty="0"/>
+              <a:t> </a:t>
+            </a:r>
+            <a:r>
+              <a:rPr lang="en-US" dirty="0" err="1" smtClean="0"/>
+              <a:t>ali</a:t>
+            </a:r>
+            <a:r>
+              <a:rPr lang="sr-Latn-RS" dirty="0" smtClean="0"/>
+              <a:t> </a:t>
+            </a:r>
+            <a:r>
+              <a:rPr lang="en-US" dirty="0" smtClean="0"/>
+              <a:t>ta </a:t>
+            </a:r>
+            <a:r>
+              <a:rPr lang="en-US" dirty="0" err="1"/>
+              <a:t>promena</a:t>
+            </a:r>
+            <a:r>
+              <a:rPr lang="en-US" dirty="0"/>
+              <a:t> </a:t>
+            </a:r>
+            <a:r>
+              <a:rPr lang="en-US" dirty="0" err="1"/>
+              <a:t>nije</a:t>
+            </a:r>
+            <a:r>
+              <a:rPr lang="en-US" dirty="0"/>
+              <a:t> </a:t>
+            </a:r>
+            <a:r>
+              <a:rPr lang="en-US" dirty="0" err="1"/>
+              <a:t>još</a:t>
+            </a:r>
+            <a:r>
+              <a:rPr lang="en-US" dirty="0"/>
+              <a:t> </a:t>
+            </a:r>
+            <a:r>
+              <a:rPr lang="en-US" dirty="0" err="1" smtClean="0"/>
+              <a:t>uvek</a:t>
+            </a:r>
+            <a:r>
+              <a:rPr lang="sr-Latn-RS" dirty="0" smtClean="0"/>
+              <a:t> </a:t>
+            </a:r>
+            <a:r>
+              <a:rPr lang="en-US" dirty="0" err="1" smtClean="0"/>
+              <a:t>komitovana</a:t>
+            </a:r>
+            <a:r>
+              <a:rPr lang="en-US" dirty="0" smtClean="0"/>
+              <a:t> </a:t>
+            </a:r>
+            <a:r>
+              <a:rPr lang="en-US" dirty="0" err="1"/>
+              <a:t>i</a:t>
+            </a:r>
+            <a:r>
+              <a:rPr lang="en-US" dirty="0"/>
+              <a:t> </a:t>
+            </a:r>
+            <a:r>
+              <a:rPr lang="en-US" dirty="0" err="1"/>
+              <a:t>sačuvana</a:t>
+            </a:r>
+            <a:r>
+              <a:rPr lang="en-US" dirty="0"/>
+              <a:t> </a:t>
+            </a:r>
+            <a:r>
+              <a:rPr lang="en-US" dirty="0" smtClean="0"/>
+              <a:t>u</a:t>
+            </a:r>
+            <a:r>
+              <a:rPr lang="sr-Latn-RS" dirty="0" smtClean="0"/>
+              <a:t> </a:t>
+            </a:r>
+            <a:r>
+              <a:rPr lang="en-US" dirty="0" err="1" smtClean="0"/>
+              <a:t>lokalnom</a:t>
+            </a:r>
+            <a:r>
+              <a:rPr lang="en-US" dirty="0" smtClean="0"/>
+              <a:t> </a:t>
+            </a:r>
+            <a:r>
+              <a:rPr lang="en-US" dirty="0" err="1" smtClean="0"/>
+              <a:t>repozitorijumu</a:t>
+            </a:r>
+            <a:endParaRPr lang="sr-Latn-RS" dirty="0" smtClean="0"/>
+          </a:p>
+          <a:p>
+            <a:r>
+              <a:rPr lang="en-US" dirty="0" err="1"/>
+              <a:t>Stejdžovan</a:t>
+            </a:r>
+            <a:r>
+              <a:rPr lang="en-US" dirty="0"/>
+              <a:t> - </a:t>
+            </a:r>
+            <a:r>
+              <a:rPr lang="en-US" dirty="0" err="1"/>
+              <a:t>izmenjen</a:t>
+            </a:r>
+            <a:r>
+              <a:rPr lang="en-US" dirty="0"/>
+              <a:t> </a:t>
+            </a:r>
+            <a:r>
+              <a:rPr lang="en-US" dirty="0" err="1"/>
+              <a:t>fajl</a:t>
+            </a:r>
+            <a:r>
+              <a:rPr lang="en-US" dirty="0"/>
+              <a:t> </a:t>
+            </a:r>
+            <a:r>
+              <a:rPr lang="en-US" dirty="0" err="1"/>
+              <a:t>koji</a:t>
+            </a:r>
+            <a:r>
+              <a:rPr lang="en-US" dirty="0"/>
+              <a:t> </a:t>
+            </a:r>
+            <a:r>
+              <a:rPr lang="en-US" dirty="0" smtClean="0"/>
+              <a:t>je</a:t>
+            </a:r>
+            <a:r>
+              <a:rPr lang="sr-Latn-RS" dirty="0" smtClean="0"/>
+              <a:t> </a:t>
+            </a:r>
+            <a:r>
+              <a:rPr lang="en-US" dirty="0" err="1" smtClean="0"/>
+              <a:t>označen</a:t>
+            </a:r>
+            <a:r>
+              <a:rPr lang="en-US" dirty="0" smtClean="0"/>
+              <a:t> </a:t>
+            </a:r>
+            <a:r>
+              <a:rPr lang="en-US" dirty="0"/>
+              <a:t>da u </a:t>
+            </a:r>
+            <a:r>
+              <a:rPr lang="en-US" dirty="0" err="1"/>
+              <a:t>svom</a:t>
+            </a:r>
+            <a:r>
+              <a:rPr lang="en-US" dirty="0"/>
+              <a:t> </a:t>
+            </a:r>
+            <a:r>
+              <a:rPr lang="en-US" dirty="0" err="1" smtClean="0"/>
+              <a:t>trenutnom</a:t>
+            </a:r>
+            <a:r>
+              <a:rPr lang="sr-Latn-RS" dirty="0" smtClean="0"/>
+              <a:t> </a:t>
+            </a:r>
+            <a:r>
+              <a:rPr lang="en-US" dirty="0" err="1" smtClean="0"/>
+              <a:t>stanju</a:t>
+            </a:r>
+            <a:r>
+              <a:rPr lang="en-US" dirty="0" smtClean="0"/>
+              <a:t> </a:t>
+            </a:r>
+            <a:r>
+              <a:rPr lang="en-US" dirty="0"/>
+              <a:t>(</a:t>
+            </a:r>
+            <a:r>
+              <a:rPr lang="en-US" dirty="0" err="1"/>
+              <a:t>treba</a:t>
+            </a:r>
+            <a:r>
+              <a:rPr lang="en-US" dirty="0"/>
+              <a:t> da </a:t>
+            </a:r>
+            <a:r>
+              <a:rPr lang="en-US" dirty="0" err="1"/>
+              <a:t>bude</a:t>
+            </a:r>
+            <a:r>
+              <a:rPr lang="en-US" dirty="0"/>
+              <a:t> </a:t>
+            </a:r>
+            <a:r>
+              <a:rPr lang="en-US" dirty="0" err="1"/>
+              <a:t>uključen</a:t>
+            </a:r>
+            <a:r>
+              <a:rPr lang="en-US" dirty="0"/>
+              <a:t> </a:t>
+            </a:r>
+            <a:r>
+              <a:rPr lang="en-US" dirty="0" err="1" smtClean="0"/>
+              <a:t>usledeći</a:t>
+            </a:r>
+            <a:r>
+              <a:rPr lang="en-US" dirty="0" smtClean="0"/>
+              <a:t> </a:t>
+            </a:r>
+            <a:r>
+              <a:rPr lang="en-US" dirty="0" err="1"/>
+              <a:t>komit</a:t>
+            </a:r>
+            <a:r>
+              <a:rPr lang="en-US" dirty="0" smtClean="0"/>
+              <a:t>)</a:t>
+            </a:r>
+            <a:endParaRPr lang="sr-Latn-RS" dirty="0" smtClean="0"/>
+          </a:p>
+          <a:p>
+            <a:r>
+              <a:rPr lang="en-US" dirty="0" err="1"/>
+              <a:t>Komitovan</a:t>
+            </a:r>
+            <a:r>
+              <a:rPr lang="en-US" dirty="0"/>
+              <a:t> - </a:t>
+            </a:r>
+            <a:r>
+              <a:rPr lang="en-US" dirty="0" err="1"/>
+              <a:t>fajl</a:t>
+            </a:r>
+            <a:r>
+              <a:rPr lang="en-US" dirty="0"/>
+              <a:t> je </a:t>
+            </a:r>
+            <a:r>
+              <a:rPr lang="en-US" dirty="0" err="1" smtClean="0"/>
+              <a:t>bezbedno</a:t>
+            </a:r>
+            <a:r>
+              <a:rPr lang="sr-Latn-RS" dirty="0" smtClean="0"/>
+              <a:t> </a:t>
+            </a:r>
+            <a:r>
+              <a:rPr lang="en-US" dirty="0" err="1" smtClean="0"/>
+              <a:t>sačuvan</a:t>
+            </a:r>
+            <a:r>
+              <a:rPr lang="en-US" dirty="0" smtClean="0"/>
+              <a:t> </a:t>
+            </a:r>
+            <a:r>
+              <a:rPr lang="en-US" dirty="0"/>
+              <a:t>u </a:t>
+            </a:r>
+            <a:r>
+              <a:rPr lang="en-US" dirty="0" err="1"/>
+              <a:t>svom</a:t>
+            </a:r>
+            <a:r>
+              <a:rPr lang="en-US" dirty="0"/>
+              <a:t> </a:t>
+            </a:r>
+            <a:r>
+              <a:rPr lang="en-US" dirty="0" err="1" smtClean="0"/>
+              <a:t>trenutnom</a:t>
+            </a:r>
+            <a:r>
+              <a:rPr lang="sr-Latn-RS" dirty="0" smtClean="0"/>
+              <a:t> </a:t>
+            </a:r>
+            <a:r>
+              <a:rPr lang="en-US" dirty="0" err="1" smtClean="0"/>
+              <a:t>stanju</a:t>
+            </a:r>
+            <a:r>
+              <a:rPr lang="en-US" dirty="0" smtClean="0"/>
+              <a:t> </a:t>
+            </a:r>
+            <a:r>
+              <a:rPr lang="en-US" dirty="0"/>
+              <a:t>u </a:t>
+            </a:r>
+            <a:r>
+              <a:rPr lang="en-US" dirty="0" err="1" smtClean="0"/>
+              <a:t>lokalnom</a:t>
+            </a:r>
+            <a:r>
+              <a:rPr lang="sr-Latn-RS" dirty="0" smtClean="0"/>
+              <a:t> </a:t>
+            </a:r>
+            <a:r>
+              <a:rPr lang="en-US" dirty="0" err="1" smtClean="0"/>
+              <a:t>repozitorijumu</a:t>
+            </a:r>
+            <a:endParaRPr lang="en-US" dirty="0"/>
+          </a:p>
+          <a:p>
+            <a:endParaRPr lang="en-US" dirty="0"/>
+          </a:p>
+        </p:txBody>
+      </p:sp>
+      <p:pic>
+        <p:nvPicPr>
+          <p:cNvPr id="1026" name="Picture 2" descr="https://phoenixnap.com/kb/wp-content/uploads/2021/09/git-workflow.png"/>
+          <p:cNvPicPr>
+            <a:picLocks noChangeAspect="1" noChangeArrowheads="1"/>
+          </p:cNvPicPr>
+          <p:nvPr/>
+        </p:nvPicPr>
+        <p:blipFill>
+          <a:blip r:embed="rId2">
+            <a:extLst>
+              <a:ext uri="{28A0092B-C50C-407E-A947-70E740481C1C}">
+                <a14:useLocalDpi xmlns:a14="http://schemas.microsoft.com/office/drawing/2010/main" val="0"/>
+              </a:ext>
+            </a:extLst>
+          </a:blip>
+          <a:srcRect/>
+          <a:stretch>
+            <a:fillRect/>
+          </a:stretch>
+        </p:blipFill>
+        <p:spPr bwMode="auto">
+          <a:xfrm>
+            <a:off x="6611113" y="2097088"/>
+            <a:ext cx="4973691" cy="3353689"/>
+          </a:xfrm>
+          <a:prstGeom prst="rect">
+            <a:avLst/>
+          </a:prstGeom>
+          <a:noFill/>
+          <a:extLst>
+            <a:ext uri="{909E8E84-426E-40DD-AFC4-6F175D3DCCD1}">
+              <a14:hiddenFill xmlns:a14="http://schemas.microsoft.com/office/drawing/2010/main">
+                <a:solidFill>
+                  <a:srgbClr val="FFFFFF"/>
+                </a:solidFill>
+              </a14:hiddenFill>
+            </a:ext>
+          </a:extLst>
+        </p:spPr>
+      </p:pic>
+    </p:spTree>
+    <p:extLst>
+      <p:ext uri="{BB962C8B-B14F-4D97-AF65-F5344CB8AC3E}">
+        <p14:creationId xmlns:p14="http://schemas.microsoft.com/office/powerpoint/2010/main" val="586983291"/>
+      </p:ext>
+    </p:extLst>
+  </p:cSld>
+  <p:clrMapOvr>
+    <a:masterClrMapping/>
+  </p:clrMapOvr>
+</p:sld>
+</file>
+
+<file path=ppt/slides/slide7.xml><?xml version="1.0" encoding="utf-8"?>
+<p:sld xmlns:a="http://schemas.openxmlformats.org/drawingml/2006/main" xmlns:r="http://schemas.openxmlformats.org/officeDocument/2006/relationships" xmlns:p="http://schemas.openxmlformats.org/presentationml/2006/main">
+  <p:cSld>
+    <p:spTree>
+      <p:nvGrpSpPr>
+        <p:cNvPr id="1" name=""/>
+        <p:cNvGrpSpPr/>
+        <p:nvPr/>
+      </p:nvGrpSpPr>
+      <p:grpSpPr>
+        <a:xfrm>
+          <a:off x="0" y="0"/>
+          <a:ext cx="0" cy="0"/>
+          <a:chOff x="0" y="0"/>
+          <a:chExt cx="0" cy="0"/>
+        </a:xfrm>
+      </p:grpSpPr>
+      <p:sp>
+        <p:nvSpPr>
+          <p:cNvPr id="2" name="Title 1"/>
+          <p:cNvSpPr>
+            <a:spLocks noGrp="1"/>
+          </p:cNvSpPr>
+          <p:nvPr>
+            <p:ph type="title"/>
+          </p:nvPr>
+        </p:nvSpPr>
+        <p:spPr/>
+        <p:txBody>
+          <a:bodyPr/>
+          <a:lstStyle/>
+          <a:p>
+            <a:r>
+              <a:rPr lang="sr-Latn-RS" dirty="0" smtClean="0"/>
+              <a:t>PODEŠAVaNJA</a:t>
+            </a:r>
+            <a:endParaRPr lang="en-US" dirty="0"/>
+          </a:p>
+        </p:txBody>
+      </p:sp>
+      <p:sp>
+        <p:nvSpPr>
+          <p:cNvPr id="3" name="Content Placeholder 2"/>
+          <p:cNvSpPr>
+            <a:spLocks noGrp="1"/>
+          </p:cNvSpPr>
+          <p:nvPr>
+            <p:ph idx="1"/>
+          </p:nvPr>
+        </p:nvSpPr>
+        <p:spPr/>
+        <p:txBody>
+          <a:bodyPr anchor="t"/>
+          <a:lstStyle/>
+          <a:p>
+            <a:r>
+              <a:rPr lang="sr-Latn-RS" dirty="0" smtClean="0"/>
+              <a:t>git config --global user.name „Mihajlo Milojević“</a:t>
+            </a:r>
+          </a:p>
+          <a:p>
+            <a:r>
+              <a:rPr lang="sr-Latn-RS" dirty="0" smtClean="0"/>
+              <a:t>git config --global user.email milojevicm374@gmail.com</a:t>
+            </a:r>
+            <a:endParaRPr lang="en-US" dirty="0"/>
+          </a:p>
+        </p:txBody>
+      </p:sp>
+    </p:spTree>
+    <p:extLst>
+      <p:ext uri="{BB962C8B-B14F-4D97-AF65-F5344CB8AC3E}">
+        <p14:creationId xmlns:p14="http://schemas.microsoft.com/office/powerpoint/2010/main" val="1381641432"/>
+      </p:ext>
+    </p:extLst>
+  </p:cSld>
+  <p:clrMapOvr>
+    <a:masterClrMapping/>
+  </p:clrMapOvr>
+</p:sld>
+</file>
+
+<file path=ppt/slides/slide8.xml><?xml version="1.0" encoding="utf-8"?>
+<p:sld xmlns:a="http://schemas.openxmlformats.org/drawingml/2006/main" xmlns:r="http://schemas.openxmlformats.org/officeDocument/2006/relationships" xmlns:p="http://schemas.openxmlformats.org/presentationml/2006/main">
+  <p:cSld>
+    <p:spTree>
+      <p:nvGrpSpPr>
+        <p:cNvPr id="1" name=""/>
+        <p:cNvGrpSpPr/>
+        <p:nvPr/>
+      </p:nvGrpSpPr>
+      <p:grpSpPr>
+        <a:xfrm>
+          <a:off x="0" y="0"/>
+          <a:ext cx="0" cy="0"/>
+          <a:chOff x="0" y="0"/>
+          <a:chExt cx="0" cy="0"/>
+        </a:xfrm>
+      </p:grpSpPr>
+      <p:sp>
+        <p:nvSpPr>
+          <p:cNvPr id="2" name="Title 1"/>
+          <p:cNvSpPr>
+            <a:spLocks noGrp="1"/>
+          </p:cNvSpPr>
+          <p:nvPr>
+            <p:ph type="title"/>
+          </p:nvPr>
+        </p:nvSpPr>
+        <p:spPr/>
+        <p:txBody>
+          <a:bodyPr/>
+          <a:lstStyle/>
+          <a:p>
+            <a:r>
+              <a:rPr lang="sr-Latn-RS" dirty="0" smtClean="0"/>
+              <a:t>POMOĆ</a:t>
+            </a:r>
+            <a:endParaRPr lang="en-US" dirty="0"/>
+          </a:p>
+        </p:txBody>
+      </p:sp>
+      <p:sp>
+        <p:nvSpPr>
+          <p:cNvPr id="3" name="Content Placeholder 2"/>
+          <p:cNvSpPr>
+            <a:spLocks noGrp="1"/>
+          </p:cNvSpPr>
+          <p:nvPr>
+            <p:ph idx="1"/>
+          </p:nvPr>
+        </p:nvSpPr>
+        <p:spPr/>
+        <p:txBody>
+          <a:bodyPr/>
+          <a:lstStyle/>
+          <a:p>
+            <a:r>
+              <a:rPr lang="sr-Latn-RS" dirty="0" smtClean="0"/>
+              <a:t>--help</a:t>
+            </a:r>
+            <a:endParaRPr lang="en-US" dirty="0"/>
+          </a:p>
+        </p:txBody>
+      </p:sp>
+    </p:spTree>
+    <p:extLst>
+      <p:ext uri="{BB962C8B-B14F-4D97-AF65-F5344CB8AC3E}">
+        <p14:creationId xmlns:p14="http://schemas.microsoft.com/office/powerpoint/2010/main" val="1359752148"/>
+      </p:ext>
+    </p:extLst>
+  </p:cSld>
+  <p:clrMapOvr>
+    <a:masterClrMapping/>
+  </p:clrMapOvr>
+</p:sld>
+</file>
+
+<file path=ppt/slides/slide9.xml><?xml version="1.0" encoding="utf-8"?>
+<p:sld xmlns:a="http://schemas.openxmlformats.org/drawingml/2006/main" xmlns:r="http://schemas.openxmlformats.org/officeDocument/2006/relationships" xmlns:p="http://schemas.openxmlformats.org/presentationml/2006/main">
+  <p:cSld>
+    <p:spTree>
+      <p:nvGrpSpPr>
+        <p:cNvPr id="1" name=""/>
+        <p:cNvGrpSpPr/>
+        <p:nvPr/>
+      </p:nvGrpSpPr>
+      <p:grpSpPr>
+        <a:xfrm>
+          <a:off x="0" y="0"/>
+          <a:ext cx="0" cy="0"/>
+          <a:chOff x="0" y="0"/>
+          <a:chExt cx="0" cy="0"/>
+        </a:xfrm>
+      </p:grpSpPr>
+      <p:sp>
+        <p:nvSpPr>
+          <p:cNvPr id="2" name="Title 1"/>
+          <p:cNvSpPr>
+            <a:spLocks noGrp="1"/>
+          </p:cNvSpPr>
+          <p:nvPr>
+            <p:ph type="title"/>
+          </p:nvPr>
+        </p:nvSpPr>
+        <p:spPr/>
+        <p:txBody>
+          <a:bodyPr/>
+          <a:lstStyle/>
+          <a:p>
+            <a:r>
+              <a:rPr lang="sr-Latn-RS" dirty="0" smtClean="0"/>
+              <a:t>Kreiranje lokalnog git repozitorijuma</a:t>
+            </a:r>
+            <a:endParaRPr lang="en-US" dirty="0"/>
+          </a:p>
+        </p:txBody>
+      </p:sp>
+      <p:sp>
+        <p:nvSpPr>
+          <p:cNvPr id="3" name="Content Placeholder 2"/>
+          <p:cNvSpPr>
+            <a:spLocks noGrp="1"/>
+          </p:cNvSpPr>
+          <p:nvPr>
+            <p:ph idx="1"/>
+          </p:nvPr>
+        </p:nvSpPr>
+        <p:spPr/>
+        <p:txBody>
+          <a:bodyPr/>
+          <a:lstStyle/>
+          <a:p>
+            <a:r>
+              <a:rPr lang="sr-Latn-RS" dirty="0" smtClean="0"/>
+              <a:t>git init</a:t>
+            </a:r>
+          </a:p>
+          <a:p>
+            <a:endParaRPr lang="sr-Latn-RS" dirty="0"/>
+          </a:p>
+          <a:p>
+            <a:pPr marL="0" indent="0">
+              <a:buNone/>
+            </a:pPr>
+            <a:r>
+              <a:rPr lang="sr-Latn-RS" dirty="0" smtClean="0"/>
+              <a:t>Skriveni .git folder</a:t>
+            </a:r>
+            <a:endParaRPr lang="en-US" dirty="0"/>
+          </a:p>
+        </p:txBody>
+      </p:sp>
+    </p:spTree>
+    <p:extLst>
+      <p:ext uri="{BB962C8B-B14F-4D97-AF65-F5344CB8AC3E}">
+        <p14:creationId xmlns:p14="http://schemas.microsoft.com/office/powerpoint/2010/main" val="3742020259"/>
       </p:ext>
     </p:extLst>
   </p:cSld>

</xml_diff>